<commit_message>
The final presentation in both pdf and .pptx format
</commit_message>
<xml_diff>
--- a/HR Analytics Presentation.pptx
+++ b/HR Analytics Presentation.pptx
@@ -118,10 +118,10 @@
   </p:defaultTextStyle>
   <p:extLst>
     <p:ext uri="{EFAFB233-063F-42B5-8137-9DF3F51BA10A}">
-      <p15:sldGuideLst xmlns="" xmlns:p15="http://schemas.microsoft.com/office/powerpoint/2012/main"/>
+      <p15:sldGuideLst xmlns:p15="http://schemas.microsoft.com/office/powerpoint/2012/main" xmlns=""/>
     </p:ext>
     <p:ext uri="{2D200454-40CA-4A62-9FC3-DE9A4176ACB9}">
-      <p15:notesGuideLst xmlns="" xmlns:p15="http://schemas.microsoft.com/office/powerpoint/2012/main"/>
+      <p15:notesGuideLst xmlns:p15="http://schemas.microsoft.com/office/powerpoint/2012/main" xmlns=""/>
     </p:ext>
   </p:extLst>
 </p:presentation>
@@ -209,7 +209,7 @@
           <a:p>
             <a:fld id="{2E309023-AF2B-4043-B228-F191CADC9BB1}" type="datetimeFigureOut">
               <a:rPr lang="en-IN" smtClean="0"/>
-              <a:t>24-11-2018</a:t>
+              <a:t>25-11-2018</a:t>
             </a:fld>
             <a:endParaRPr lang="en-IN"/>
           </a:p>
@@ -608,7 +608,7 @@
           <a:p>
             <a:fld id="{70C018FE-C8D6-4A9C-A702-41F1E0C1C452}" type="datetimeFigureOut">
               <a:rPr lang="en-IN" smtClean="0"/>
-              <a:t>24-11-2018</a:t>
+              <a:t>25-11-2018</a:t>
             </a:fld>
             <a:endParaRPr lang="en-IN"/>
           </a:p>
@@ -778,7 +778,7 @@
           <a:p>
             <a:fld id="{70C018FE-C8D6-4A9C-A702-41F1E0C1C452}" type="datetimeFigureOut">
               <a:rPr lang="en-IN" smtClean="0"/>
-              <a:t>24-11-2018</a:t>
+              <a:t>25-11-2018</a:t>
             </a:fld>
             <a:endParaRPr lang="en-IN"/>
           </a:p>
@@ -958,7 +958,7 @@
           <a:p>
             <a:fld id="{70C018FE-C8D6-4A9C-A702-41F1E0C1C452}" type="datetimeFigureOut">
               <a:rPr lang="en-IN" smtClean="0"/>
-              <a:t>24-11-2018</a:t>
+              <a:t>25-11-2018</a:t>
             </a:fld>
             <a:endParaRPr lang="en-IN"/>
           </a:p>
@@ -1390,7 +1390,7 @@
           <a:p>
             <a:fld id="{70C018FE-C8D6-4A9C-A702-41F1E0C1C452}" type="datetimeFigureOut">
               <a:rPr lang="en-IN" smtClean="0"/>
-              <a:t>24-11-2018</a:t>
+              <a:t>25-11-2018</a:t>
             </a:fld>
             <a:endParaRPr lang="en-IN"/>
           </a:p>
@@ -1622,7 +1622,7 @@
           <a:p>
             <a:fld id="{70C018FE-C8D6-4A9C-A702-41F1E0C1C452}" type="datetimeFigureOut">
               <a:rPr lang="en-IN" smtClean="0"/>
-              <a:t>24-11-2018</a:t>
+              <a:t>25-11-2018</a:t>
             </a:fld>
             <a:endParaRPr lang="en-IN"/>
           </a:p>
@@ -1989,7 +1989,7 @@
           <a:p>
             <a:fld id="{70C018FE-C8D6-4A9C-A702-41F1E0C1C452}" type="datetimeFigureOut">
               <a:rPr lang="en-IN" smtClean="0"/>
-              <a:t>24-11-2018</a:t>
+              <a:t>25-11-2018</a:t>
             </a:fld>
             <a:endParaRPr lang="en-IN"/>
           </a:p>
@@ -2107,7 +2107,7 @@
           <a:p>
             <a:fld id="{70C018FE-C8D6-4A9C-A702-41F1E0C1C452}" type="datetimeFigureOut">
               <a:rPr lang="en-IN" smtClean="0"/>
-              <a:t>24-11-2018</a:t>
+              <a:t>25-11-2018</a:t>
             </a:fld>
             <a:endParaRPr lang="en-IN"/>
           </a:p>
@@ -2202,7 +2202,7 @@
           <a:p>
             <a:fld id="{70C018FE-C8D6-4A9C-A702-41F1E0C1C452}" type="datetimeFigureOut">
               <a:rPr lang="en-IN" smtClean="0"/>
-              <a:t>24-11-2018</a:t>
+              <a:t>25-11-2018</a:t>
             </a:fld>
             <a:endParaRPr lang="en-IN"/>
           </a:p>
@@ -2478,7 +2478,7 @@
           <a:p>
             <a:fld id="{70C018FE-C8D6-4A9C-A702-41F1E0C1C452}" type="datetimeFigureOut">
               <a:rPr lang="en-IN" smtClean="0"/>
-              <a:t>24-11-2018</a:t>
+              <a:t>25-11-2018</a:t>
             </a:fld>
             <a:endParaRPr lang="en-IN"/>
           </a:p>
@@ -2735,7 +2735,7 @@
           <a:p>
             <a:fld id="{70C018FE-C8D6-4A9C-A702-41F1E0C1C452}" type="datetimeFigureOut">
               <a:rPr lang="en-IN" smtClean="0"/>
-              <a:t>24-11-2018</a:t>
+              <a:t>25-11-2018</a:t>
             </a:fld>
             <a:endParaRPr lang="en-IN"/>
           </a:p>
@@ -2946,7 +2946,7 @@
           <a:p>
             <a:fld id="{70C018FE-C8D6-4A9C-A702-41F1E0C1C452}" type="datetimeFigureOut">
               <a:rPr lang="en-IN" smtClean="0"/>
-              <a:t>24-11-2018</a:t>
+              <a:t>25-11-2018</a:t>
             </a:fld>
             <a:endParaRPr lang="en-IN" dirty="0"/>
           </a:p>
@@ -3459,25 +3459,25 @@
           <a:lstStyle/>
           <a:p>
             <a:r>
-              <a:rPr lang="en-IN" sz="2800" dirty="0" smtClean="0"/>
+              <a:rPr lang="en-IN" sz="3200" dirty="0" smtClean="0"/>
               <a:t>HR ANALYTICS </a:t>
             </a:r>
             <a:r>
-              <a:rPr lang="en-IN" sz="2800" dirty="0"/>
+              <a:rPr lang="en-IN" sz="3200" dirty="0"/>
               <a:t>CASE STUDY </a:t>
             </a:r>
             <a:br>
-              <a:rPr lang="en-IN" sz="2800" dirty="0"/>
+              <a:rPr lang="en-IN" sz="3200" dirty="0"/>
             </a:br>
             <a:r>
-              <a:rPr lang="en-IN" sz="2800" dirty="0"/>
+              <a:rPr lang="en-IN" sz="3200" dirty="0"/>
               <a:t/>
             </a:r>
             <a:br>
-              <a:rPr lang="en-IN" sz="2800" dirty="0"/>
+              <a:rPr lang="en-IN" sz="3200" dirty="0"/>
             </a:br>
             <a:r>
-              <a:rPr lang="en-IN" sz="2800" dirty="0"/>
+              <a:rPr lang="en-IN" sz="3200" dirty="0"/>
               <a:t>SUBMISSION </a:t>
             </a:r>
           </a:p>
@@ -3655,10 +3655,34 @@
           </a:bodyPr>
           <a:lstStyle/>
           <a:p>
-            <a:pPr marL="0" indent="0">
-              <a:buNone/>
+            <a:pPr>
+              <a:buFont typeface="Wingdings" panose="05000000000000000000" pitchFamily="2" charset="2"/>
+              <a:buChar char="v"/>
             </a:pPr>
-            <a:endParaRPr lang="en-IN" sz="1400" dirty="0"/>
+            <a:r>
+              <a:rPr lang="en-IN" sz="1600" dirty="0" smtClean="0"/>
+              <a:t>The KS statistics value for the generated model is 41.7.</a:t>
+            </a:r>
+          </a:p>
+          <a:p>
+            <a:pPr>
+              <a:buFont typeface="Wingdings" panose="05000000000000000000" pitchFamily="2" charset="2"/>
+              <a:buChar char="v"/>
+            </a:pPr>
+            <a:r>
+              <a:rPr lang="en-IN" sz="1600" dirty="0" smtClean="0"/>
+              <a:t>Both the gain and lift chart values predict a fair amount of employees leaving the company which is again verified by a good KS statistic value. </a:t>
+            </a:r>
+          </a:p>
+          <a:p>
+            <a:pPr>
+              <a:buFont typeface="Wingdings" panose="05000000000000000000" pitchFamily="2" charset="2"/>
+              <a:buChar char="v"/>
+            </a:pPr>
+            <a:r>
+              <a:rPr lang="en-IN" sz="1600" dirty="0" smtClean="0"/>
+              <a:t>From the overall model accuracy of 70.5% , the KS statistic value and the gain and lift charts, the model is evaluated to be performing well in predicting the attrition of the employees.</a:t>
+            </a:r>
           </a:p>
         </p:txBody>
       </p:sp>
@@ -3679,17 +3703,17 @@
           </a:xfrm>
         </p:spPr>
         <p:txBody>
-          <a:bodyPr/>
-          <a:lstStyle/>
-          <a:p>
-            <a:r>
-              <a:rPr lang="en-IN" b="1" dirty="0"/>
-              <a:t> </a:t>
-            </a:r>
-            <a:r>
-              <a:rPr lang="en-IN" sz="2800" dirty="0"/>
-              <a:t>&lt;Conclusions&gt;</a:t>
-            </a:r>
+          <a:bodyPr>
+            <a:normAutofit/>
+          </a:bodyPr>
+          <a:lstStyle/>
+          <a:p>
+            <a:pPr algn="ctr"/>
+            <a:r>
+              <a:rPr lang="en-IN" sz="3200" dirty="0" smtClean="0"/>
+              <a:t>Conclusions</a:t>
+            </a:r>
+            <a:endParaRPr lang="en-IN" sz="3200" dirty="0"/>
           </a:p>
         </p:txBody>
       </p:sp>
@@ -3746,11 +3770,7 @@
             </a:pPr>
             <a:r>
               <a:rPr lang="en-IN" sz="1800" dirty="0" smtClean="0"/>
-              <a:t>Company XYZ </a:t>
-            </a:r>
-            <a:r>
-              <a:rPr lang="en-IN" sz="1800" dirty="0" smtClean="0"/>
-              <a:t>suffers from employees attrition with the rate of 15% employees leaving the company despite the company hiring around 4000 employees at any given point of time.</a:t>
+              <a:t>Company XYZ suffers from employees attrition with the rate of 15% employees leaving the company despite the company hiring around 4000 employees at any given point of time.</a:t>
             </a:r>
           </a:p>
           <a:p>
@@ -3758,6 +3778,84 @@
               <a:buFont typeface="Wingdings" panose="05000000000000000000" pitchFamily="2" charset="2"/>
               <a:buChar char="v"/>
             </a:pPr>
+            <a:r>
+              <a:rPr lang="en-IN" sz="1800" dirty="0" smtClean="0"/>
+              <a:t>This kind of attrition is bad for the company due to the following reasons :</a:t>
+            </a:r>
+          </a:p>
+          <a:p>
+            <a:pPr marL="800100" lvl="1" indent="-342900">
+              <a:buFont typeface="+mj-lt"/>
+              <a:buAutoNum type="arabicPeriod"/>
+            </a:pPr>
+            <a:r>
+              <a:rPr lang="en-US" sz="1600" dirty="0"/>
+              <a:t>The former employees’ projects get delayed, which makes it difficult to meet </a:t>
+            </a:r>
+            <a:r>
+              <a:rPr lang="en-US" sz="1600" b="1" dirty="0"/>
+              <a:t>timelines</a:t>
+            </a:r>
+            <a:r>
+              <a:rPr lang="en-US" sz="1600" dirty="0"/>
+              <a:t>, resulting in a reputation loss among consumers and </a:t>
+            </a:r>
+            <a:r>
+              <a:rPr lang="en-US" sz="1600" dirty="0" smtClean="0"/>
+              <a:t>partners.</a:t>
+            </a:r>
+          </a:p>
+          <a:p>
+            <a:pPr marL="800100" lvl="1" indent="-342900">
+              <a:buFont typeface="+mj-lt"/>
+              <a:buAutoNum type="arabicPeriod"/>
+            </a:pPr>
+            <a:r>
+              <a:rPr lang="en-US" sz="1600" dirty="0"/>
+              <a:t>A sizeable department has to be maintained, for the purposes of </a:t>
+            </a:r>
+            <a:r>
+              <a:rPr lang="en-US" sz="1600" b="1" dirty="0"/>
+              <a:t>recruiting</a:t>
+            </a:r>
+            <a:r>
+              <a:rPr lang="en-US" sz="1600" dirty="0"/>
+              <a:t> new </a:t>
+            </a:r>
+            <a:r>
+              <a:rPr lang="en-US" sz="1600" dirty="0" smtClean="0"/>
+              <a:t>talent.</a:t>
+            </a:r>
+          </a:p>
+          <a:p>
+            <a:pPr marL="800100" lvl="1" indent="-342900">
+              <a:buFont typeface="+mj-lt"/>
+              <a:buAutoNum type="arabicPeriod"/>
+            </a:pPr>
+            <a:r>
+              <a:rPr lang="en-US" sz="1600" dirty="0"/>
+              <a:t>T</a:t>
+            </a:r>
+            <a:r>
+              <a:rPr lang="en-US" sz="1600" dirty="0" smtClean="0"/>
+              <a:t>he </a:t>
+            </a:r>
+            <a:r>
+              <a:rPr lang="en-US" sz="1600" dirty="0"/>
+              <a:t>new employees have to be </a:t>
+            </a:r>
+            <a:r>
+              <a:rPr lang="en-US" sz="1600" b="1" dirty="0"/>
+              <a:t>trained</a:t>
+            </a:r>
+            <a:r>
+              <a:rPr lang="en-US" sz="1600" dirty="0"/>
+              <a:t> for the </a:t>
+            </a:r>
+            <a:r>
+              <a:rPr lang="en-US" sz="1600" dirty="0" smtClean="0"/>
+              <a:t>job</a:t>
+            </a:r>
             <a:endParaRPr lang="en-IN" sz="1800" dirty="0" smtClean="0"/>
           </a:p>
           <a:p>
@@ -3767,96 +3865,7 @@
             </a:pPr>
             <a:r>
               <a:rPr lang="en-IN" sz="1800" dirty="0" smtClean="0"/>
-              <a:t>This kind of attrition is bad for the company due to the following reasons :</a:t>
-            </a:r>
-          </a:p>
-          <a:p>
-            <a:pPr marL="800100" lvl="1" indent="-342900">
-              <a:buFont typeface="+mj-lt"/>
-              <a:buAutoNum type="arabicPeriod"/>
-            </a:pPr>
-            <a:r>
-              <a:rPr lang="en-US" sz="1600" dirty="0"/>
-              <a:t>The former employees’ projects get delayed, which makes it difficult to meet </a:t>
-            </a:r>
-            <a:r>
-              <a:rPr lang="en-US" sz="1600" b="1" dirty="0"/>
-              <a:t>timelines</a:t>
-            </a:r>
-            <a:r>
-              <a:rPr lang="en-US" sz="1600" dirty="0"/>
-              <a:t>, resulting in a reputation loss among consumers and </a:t>
-            </a:r>
-            <a:r>
-              <a:rPr lang="en-US" sz="1600" dirty="0" smtClean="0"/>
-              <a:t>partners.</a:t>
-            </a:r>
-          </a:p>
-          <a:p>
-            <a:pPr marL="800100" lvl="1" indent="-342900">
-              <a:buFont typeface="+mj-lt"/>
-              <a:buAutoNum type="arabicPeriod"/>
-            </a:pPr>
-            <a:r>
-              <a:rPr lang="en-US" sz="1600" dirty="0"/>
-              <a:t>A sizeable department has to be maintained, for the purposes of </a:t>
-            </a:r>
-            <a:r>
-              <a:rPr lang="en-US" sz="1600" b="1" dirty="0"/>
-              <a:t>recruiting</a:t>
-            </a:r>
-            <a:r>
-              <a:rPr lang="en-US" sz="1600" dirty="0"/>
-              <a:t> new </a:t>
-            </a:r>
-            <a:r>
-              <a:rPr lang="en-US" sz="1600" dirty="0" smtClean="0"/>
-              <a:t>talent.</a:t>
-            </a:r>
-          </a:p>
-          <a:p>
-            <a:pPr marL="800100" lvl="1" indent="-342900">
-              <a:buFont typeface="+mj-lt"/>
-              <a:buAutoNum type="arabicPeriod"/>
-            </a:pPr>
-            <a:r>
-              <a:rPr lang="en-US" sz="1600" dirty="0"/>
-              <a:t>T</a:t>
-            </a:r>
-            <a:r>
-              <a:rPr lang="en-US" sz="1600" dirty="0" smtClean="0"/>
-              <a:t>he </a:t>
-            </a:r>
-            <a:r>
-              <a:rPr lang="en-US" sz="1600" dirty="0"/>
-              <a:t>new employees have to be </a:t>
-            </a:r>
-            <a:r>
-              <a:rPr lang="en-US" sz="1600" b="1" dirty="0"/>
-              <a:t>trained</a:t>
-            </a:r>
-            <a:r>
-              <a:rPr lang="en-US" sz="1600" dirty="0"/>
-              <a:t> for the </a:t>
-            </a:r>
-            <a:r>
-              <a:rPr lang="en-US" sz="1600" dirty="0" smtClean="0"/>
-              <a:t>job</a:t>
-            </a:r>
-            <a:endParaRPr lang="en-IN" sz="1800" dirty="0" smtClean="0"/>
-          </a:p>
-          <a:p>
-            <a:pPr>
-              <a:buFont typeface="Wingdings" panose="05000000000000000000" pitchFamily="2" charset="2"/>
-              <a:buChar char="v"/>
-            </a:pPr>
-            <a:r>
-              <a:rPr lang="en-IN" sz="1800" dirty="0" smtClean="0"/>
-              <a:t> Hence, the main target is to analyse the data and predict </a:t>
-            </a:r>
-            <a:r>
-              <a:rPr lang="en-IN" sz="1800" dirty="0" smtClean="0"/>
-              <a:t>the employees who ar</a:t>
+              <a:t> Hence, the main target is to analyse the data and predict the employees who ar</a:t>
             </a:r>
             <a:r>
               <a:rPr lang="en-IN" sz="1800" dirty="0"/>
@@ -3966,7 +3975,6 @@
               <a:rPr lang="en-IN" sz="1800" dirty="0" smtClean="0"/>
               <a:t>The employee survey data consists of data about how each employee feels about his/her job and the working environment.</a:t>
             </a:r>
-            <a:endParaRPr lang="en-IN" sz="1800" dirty="0" smtClean="0"/>
           </a:p>
           <a:p>
             <a:pPr>
@@ -3977,7 +3985,6 @@
               <a:rPr lang="en-IN" sz="1800" dirty="0" smtClean="0"/>
               <a:t>Manager survey data consists of each employees’ performance rating.</a:t>
             </a:r>
-            <a:endParaRPr lang="en-IN" sz="1800" dirty="0" smtClean="0"/>
           </a:p>
           <a:p>
             <a:pPr>
@@ -3998,7 +4005,6 @@
               <a:rPr lang="en-IN" sz="1800" dirty="0" smtClean="0"/>
               <a:t>Both in-time and out-time are used for the purpose of attendance of each employee. The difference of both the datasets has been used for computing the average working hours of each employee on a monthly basis.</a:t>
             </a:r>
-            <a:endParaRPr lang="en-IN" sz="1800" dirty="0" smtClean="0"/>
           </a:p>
           <a:p>
             <a:pPr>
@@ -4017,11 +4023,7 @@
             </a:pPr>
             <a:r>
               <a:rPr lang="en-IN" sz="1800" dirty="0" smtClean="0"/>
-              <a:t>Moreover, outliers have als</a:t>
-            </a:r>
-            <a:r>
-              <a:rPr lang="en-IN" sz="1800" dirty="0" smtClean="0"/>
-              <a:t>o been detected which have been treated using the appropriate statistical measures.</a:t>
+              <a:t>Moreover, outliers have also been detected which have been treated using the appropriate statistical measures.</a:t>
             </a:r>
             <a:endParaRPr lang="en-IN" sz="1800" dirty="0"/>
           </a:p>
@@ -4108,7 +4110,7 @@
             <a:pPr algn="ctr"/>
             <a:r>
               <a:rPr lang="en-IN" sz="3200" dirty="0" smtClean="0"/>
-              <a:t>Data Preparation &amp; EDA</a:t>
+              <a:t>EDA</a:t>
             </a:r>
             <a:endParaRPr lang="en-IN" sz="2000" dirty="0"/>
           </a:p>
@@ -4147,16 +4149,64 @@
             </a:pPr>
             <a:r>
               <a:rPr lang="en-IN" sz="1800" dirty="0" smtClean="0"/>
-              <a:t>The merged variable has 111 missing values which were addressed </a:t>
-            </a:r>
-            <a:r>
-              <a:rPr lang="en-IN" sz="1800" dirty="0" err="1" smtClean="0"/>
-              <a:t>columnwise</a:t>
-            </a:r>
-            <a:r>
-              <a:rPr lang="en-IN" sz="1800" smtClean="0"/>
-              <a:t>.</a:t>
-            </a:r>
+              <a:t>The merged variable has 111 missing values which were addressed column-wise. The variables environment satisfaction, job satisfaction, work life balance were found to have missing values.</a:t>
+            </a:r>
+          </a:p>
+          <a:p>
+            <a:pPr>
+              <a:buFont typeface="Wingdings" panose="05000000000000000000" pitchFamily="2" charset="2"/>
+              <a:buChar char="v"/>
+            </a:pPr>
+            <a:r>
+              <a:rPr lang="en-IN" sz="1800" dirty="0" smtClean="0"/>
+              <a:t>The missing values have been removed with the highest frequency values.</a:t>
+            </a:r>
+          </a:p>
+          <a:p>
+            <a:pPr>
+              <a:buFont typeface="Wingdings" panose="05000000000000000000" pitchFamily="2" charset="2"/>
+              <a:buChar char="v"/>
+            </a:pPr>
+            <a:r>
+              <a:rPr lang="en-IN" sz="1800" dirty="0" smtClean="0"/>
+              <a:t>The data had 5 numeric variables having outliers which have been treated.</a:t>
+            </a:r>
+          </a:p>
+          <a:p>
+            <a:pPr>
+              <a:buFont typeface="Wingdings" panose="05000000000000000000" pitchFamily="2" charset="2"/>
+              <a:buChar char="v"/>
+            </a:pPr>
+            <a:r>
+              <a:rPr lang="en-IN" sz="1800" dirty="0"/>
+              <a:t> </a:t>
+            </a:r>
+            <a:r>
+              <a:rPr lang="en-IN" sz="1800" dirty="0" smtClean="0"/>
+              <a:t>The date-time variables have been standardised using appropriate methodologies.</a:t>
+            </a:r>
+          </a:p>
+          <a:p>
+            <a:pPr>
+              <a:buFont typeface="Wingdings" panose="05000000000000000000" pitchFamily="2" charset="2"/>
+              <a:buChar char="v"/>
+            </a:pPr>
+            <a:r>
+              <a:rPr lang="en-IN" sz="1800" dirty="0" smtClean="0"/>
+              <a:t>The missing date-time values have been replaced with 0 to ease the calculation of average working hours.</a:t>
+            </a:r>
+          </a:p>
+          <a:p>
+            <a:pPr marL="0" indent="0">
+              <a:buNone/>
+            </a:pPr>
+            <a:endParaRPr lang="en-IN" sz="1800" dirty="0" smtClean="0"/>
+          </a:p>
+          <a:p>
+            <a:pPr>
+              <a:buFont typeface="Wingdings" panose="05000000000000000000" pitchFamily="2" charset="2"/>
+              <a:buChar char="v"/>
+            </a:pPr>
             <a:endParaRPr lang="en-IN" sz="1800" dirty="0"/>
           </a:p>
         </p:txBody>
@@ -4203,39 +4253,156 @@
         </p:nvSpPr>
         <p:spPr/>
         <p:txBody>
-          <a:bodyPr/>
-          <a:lstStyle/>
-          <a:p>
-            <a:r>
-              <a:rPr lang="en-IN" b="1" dirty="0"/>
-              <a:t> </a:t>
-            </a:r>
-            <a:r>
-              <a:rPr lang="en-IN" sz="2800" dirty="0"/>
-              <a:t>&lt;Analysis&gt;</a:t>
-            </a:r>
-          </a:p>
-        </p:txBody>
-      </p:sp>
-      <p:sp>
-        <p:nvSpPr>
-          <p:cNvPr id="3" name="Content Placeholder 2"/>
-          <p:cNvSpPr>
-            <a:spLocks noGrp="1"/>
-          </p:cNvSpPr>
-          <p:nvPr>
-            <p:ph idx="1"/>
-          </p:nvPr>
-        </p:nvSpPr>
-        <p:spPr/>
-        <p:txBody>
           <a:bodyPr>
             <a:normAutofit/>
           </a:bodyPr>
           <a:lstStyle/>
           <a:p>
-            <a:pPr marL="0" indent="0">
-              <a:buNone/>
+            <a:pPr algn="ctr"/>
+            <a:r>
+              <a:rPr lang="en-IN" sz="3200" dirty="0" smtClean="0"/>
+              <a:t>Data Preparation</a:t>
+            </a:r>
+            <a:endParaRPr lang="en-IN" sz="2000" dirty="0"/>
+          </a:p>
+        </p:txBody>
+      </p:sp>
+      <p:sp>
+        <p:nvSpPr>
+          <p:cNvPr id="3" name="Content Placeholder 2"/>
+          <p:cNvSpPr>
+            <a:spLocks noGrp="1"/>
+          </p:cNvSpPr>
+          <p:nvPr>
+            <p:ph idx="1"/>
+          </p:nvPr>
+        </p:nvSpPr>
+        <p:spPr/>
+        <p:txBody>
+          <a:bodyPr>
+            <a:normAutofit/>
+          </a:bodyPr>
+          <a:lstStyle/>
+          <a:p>
+            <a:pPr>
+              <a:buFont typeface="Wingdings" panose="05000000000000000000" pitchFamily="2" charset="2"/>
+              <a:buChar char="v"/>
+            </a:pPr>
+            <a:r>
+              <a:rPr lang="en-IN" sz="1800" dirty="0" smtClean="0"/>
+              <a:t>Initially, all the numeric variables have been scaled to prevent a biased model and prediction.</a:t>
+            </a:r>
+          </a:p>
+          <a:p>
+            <a:pPr>
+              <a:buFont typeface="Wingdings" panose="05000000000000000000" pitchFamily="2" charset="2"/>
+              <a:buChar char="v"/>
+            </a:pPr>
+            <a:r>
+              <a:rPr lang="en-IN" sz="1800" dirty="0" smtClean="0"/>
+              <a:t>The creation of dummy variables has been carried out in two steps:</a:t>
+            </a:r>
+          </a:p>
+          <a:p>
+            <a:pPr marL="800100" lvl="1" indent="-342900">
+              <a:buFont typeface="+mj-lt"/>
+              <a:buAutoNum type="arabicPeriod"/>
+            </a:pPr>
+            <a:r>
+              <a:rPr lang="en-IN" sz="1600" dirty="0" smtClean="0"/>
+              <a:t>Creation of binary level dummy variables.</a:t>
+            </a:r>
+          </a:p>
+          <a:p>
+            <a:pPr marL="800100" lvl="1" indent="-342900">
+              <a:buFont typeface="+mj-lt"/>
+              <a:buAutoNum type="arabicPeriod"/>
+            </a:pPr>
+            <a:r>
+              <a:rPr lang="en-IN" sz="1600" dirty="0" smtClean="0"/>
+              <a:t>Creation of multiple level dummy variables.</a:t>
+            </a:r>
+            <a:endParaRPr lang="en-IN" sz="2000" dirty="0" smtClean="0"/>
+          </a:p>
+          <a:p>
+            <a:pPr>
+              <a:buFont typeface="Wingdings" panose="05000000000000000000" pitchFamily="2" charset="2"/>
+              <a:buChar char="v"/>
+            </a:pPr>
+            <a:r>
+              <a:rPr lang="en-IN" sz="1800" dirty="0" smtClean="0"/>
+              <a:t>Creation of difference and average working hours </a:t>
+            </a:r>
+            <a:r>
+              <a:rPr lang="en-IN" sz="1800" dirty="0" err="1" smtClean="0"/>
+              <a:t>dataframe</a:t>
+            </a:r>
+            <a:r>
+              <a:rPr lang="en-IN" sz="1800" dirty="0" smtClean="0"/>
+              <a:t> to compute store the result of average hours spent by each employee on the job per month</a:t>
+            </a:r>
+            <a:r>
+              <a:rPr lang="en-IN" sz="1800" dirty="0" smtClean="0"/>
+              <a:t>.</a:t>
+            </a:r>
+          </a:p>
+          <a:p>
+            <a:pPr>
+              <a:buFont typeface="Wingdings" panose="05000000000000000000" pitchFamily="2" charset="2"/>
+              <a:buChar char="v"/>
+            </a:pPr>
+            <a:r>
+              <a:rPr lang="en-IN" sz="1800" dirty="0" smtClean="0"/>
+              <a:t>The average working hours data is then merged with the master dataset and further </a:t>
+            </a:r>
+            <a:r>
+              <a:rPr lang="en-IN" sz="1800" dirty="0" err="1" smtClean="0"/>
+              <a:t>eda</a:t>
+            </a:r>
+            <a:r>
+              <a:rPr lang="en-IN" sz="1800" dirty="0" smtClean="0"/>
+              <a:t> is carried out on the merged </a:t>
+            </a:r>
+            <a:r>
+              <a:rPr lang="en-IN" sz="1800" dirty="0" err="1" smtClean="0"/>
+              <a:t>dataframe</a:t>
+            </a:r>
+            <a:r>
+              <a:rPr lang="en-IN" sz="1800" dirty="0" smtClean="0"/>
+              <a:t>.</a:t>
+            </a:r>
+            <a:endParaRPr lang="en-IN" sz="1800" dirty="0" smtClean="0"/>
+          </a:p>
+          <a:p>
+            <a:pPr marL="800100" lvl="1" indent="-342900">
+              <a:buFont typeface="+mj-lt"/>
+              <a:buAutoNum type="arabicPeriod"/>
+            </a:pPr>
+            <a:endParaRPr lang="en-IN" sz="1400" dirty="0" smtClean="0"/>
+          </a:p>
+          <a:p>
+            <a:pPr marL="269875" lvl="1" indent="-269875">
+              <a:buFont typeface="Wingdings" panose="05000000000000000000" pitchFamily="2" charset="2"/>
+              <a:buChar char="v"/>
+            </a:pPr>
+            <a:endParaRPr lang="en-IN" sz="1400" dirty="0" smtClean="0"/>
+          </a:p>
+          <a:p>
+            <a:pPr marL="457200" lvl="1" indent="0">
+              <a:buNone/>
+            </a:pPr>
+            <a:endParaRPr lang="en-IN" sz="1400" dirty="0" smtClean="0"/>
+          </a:p>
+          <a:p>
+            <a:pPr marL="457200" lvl="1" indent="0">
+              <a:buNone/>
+            </a:pPr>
+            <a:endParaRPr lang="en-IN" sz="1400" dirty="0"/>
+          </a:p>
+          <a:p>
+            <a:pPr lvl="1">
+              <a:buFont typeface="Wingdings" panose="05000000000000000000" pitchFamily="2" charset="2"/>
+              <a:buChar char="v"/>
             </a:pPr>
             <a:endParaRPr lang="en-IN" sz="1400" dirty="0"/>
           </a:p>
@@ -4283,41 +4450,90 @@
         </p:nvSpPr>
         <p:spPr/>
         <p:txBody>
-          <a:bodyPr/>
-          <a:lstStyle/>
-          <a:p>
-            <a:r>
-              <a:rPr lang="en-IN" b="1" dirty="0"/>
-              <a:t> </a:t>
-            </a:r>
-            <a:r>
-              <a:rPr lang="en-IN" sz="2800" dirty="0"/>
-              <a:t>&lt;Analysis&gt;</a:t>
-            </a:r>
-          </a:p>
-        </p:txBody>
-      </p:sp>
-      <p:sp>
-        <p:nvSpPr>
-          <p:cNvPr id="3" name="Content Placeholder 2"/>
-          <p:cNvSpPr>
-            <a:spLocks noGrp="1"/>
-          </p:cNvSpPr>
-          <p:nvPr>
-            <p:ph idx="1"/>
-          </p:nvPr>
-        </p:nvSpPr>
-        <p:spPr/>
-        <p:txBody>
           <a:bodyPr>
             <a:normAutofit/>
           </a:bodyPr>
           <a:lstStyle/>
           <a:p>
-            <a:pPr marL="0" indent="0">
-              <a:buNone/>
+            <a:pPr algn="ctr"/>
+            <a:r>
+              <a:rPr lang="en-IN" sz="3200" dirty="0" smtClean="0"/>
+              <a:t>Model Building</a:t>
+            </a:r>
+            <a:endParaRPr lang="en-IN" sz="3200" dirty="0"/>
+          </a:p>
+        </p:txBody>
+      </p:sp>
+      <p:sp>
+        <p:nvSpPr>
+          <p:cNvPr id="3" name="Content Placeholder 2"/>
+          <p:cNvSpPr>
+            <a:spLocks noGrp="1"/>
+          </p:cNvSpPr>
+          <p:nvPr>
+            <p:ph idx="1"/>
+          </p:nvPr>
+        </p:nvSpPr>
+        <p:spPr/>
+        <p:txBody>
+          <a:bodyPr>
+            <a:normAutofit/>
+          </a:bodyPr>
+          <a:lstStyle/>
+          <a:p>
+            <a:pPr>
+              <a:buFont typeface="Wingdings" panose="05000000000000000000" pitchFamily="2" charset="2"/>
+              <a:buChar char="v"/>
             </a:pPr>
-            <a:endParaRPr lang="en-IN" sz="1400" dirty="0"/>
+            <a:r>
+              <a:rPr lang="en-IN" sz="1800" dirty="0" smtClean="0"/>
+              <a:t>The master data has been split into train and test data with 70:30 ratio.</a:t>
+            </a:r>
+          </a:p>
+          <a:p>
+            <a:pPr>
+              <a:buFont typeface="Wingdings" panose="05000000000000000000" pitchFamily="2" charset="2"/>
+              <a:buChar char="v"/>
+            </a:pPr>
+            <a:r>
+              <a:rPr lang="en-IN" sz="1800" dirty="0" smtClean="0"/>
+              <a:t>For all th</a:t>
+            </a:r>
+            <a:r>
+              <a:rPr lang="en-IN" sz="1800" dirty="0" smtClean="0"/>
+              <a:t>e models created, the number of significant variables, AIC values and the </a:t>
+            </a:r>
+            <a:r>
+              <a:rPr lang="en-IN" sz="1800" dirty="0" err="1" smtClean="0"/>
+              <a:t>vif</a:t>
+            </a:r>
+            <a:r>
+              <a:rPr lang="en-IN" sz="1800" dirty="0" smtClean="0"/>
+              <a:t> values have been considered and the insignificant ones removed.</a:t>
+            </a:r>
+          </a:p>
+          <a:p>
+            <a:pPr>
+              <a:buFont typeface="Wingdings" panose="05000000000000000000" pitchFamily="2" charset="2"/>
+              <a:buChar char="v"/>
+            </a:pPr>
+            <a:r>
+              <a:rPr lang="en-IN" sz="1800" dirty="0"/>
+              <a:t> </a:t>
+            </a:r>
+            <a:r>
+              <a:rPr lang="en-IN" sz="1800" dirty="0" smtClean="0"/>
+              <a:t>The most optimal model has 12 significant variables with </a:t>
+            </a:r>
+            <a:r>
+              <a:rPr lang="en-IN" sz="1800" dirty="0" err="1" smtClean="0"/>
+              <a:t>vif</a:t>
+            </a:r>
+            <a:r>
+              <a:rPr lang="en-IN" sz="1800" dirty="0" smtClean="0"/>
+              <a:t> values for each variable less than 2( as per business standards).</a:t>
+            </a:r>
+            <a:endParaRPr lang="en-IN" sz="1800" dirty="0" smtClean="0"/>
           </a:p>
         </p:txBody>
       </p:sp>
@@ -4368,13 +4584,62 @@
           </a:bodyPr>
           <a:lstStyle/>
           <a:p>
-            <a:pPr marL="0" indent="0">
-              <a:buNone/>
+            <a:pPr>
+              <a:buFont typeface="Wingdings" panose="05000000000000000000" pitchFamily="2" charset="2"/>
+              <a:buChar char="v"/>
             </a:pPr>
             <a:r>
+              <a:rPr lang="en-IN" sz="1800" dirty="0" smtClean="0"/>
+              <a:t> After predicting the results, the confusion matrix has been formed in order to view and create a balance between sensitivity and specificity to get the optimal results and optimum accuracy of the model.</a:t>
+            </a:r>
+          </a:p>
+          <a:p>
+            <a:pPr>
+              <a:buFont typeface="Wingdings" panose="05000000000000000000" pitchFamily="2" charset="2"/>
+              <a:buChar char="v"/>
+            </a:pPr>
+            <a:r>
+              <a:rPr lang="en-IN" sz="1800" dirty="0" smtClean="0"/>
+              <a:t>A higher value of sensitivity gives higher true positive value and lower false negative values. Therefore, a fair amount of actual attrition can be predicted. Hence, the threshold for predicted attrition has been taken as 0.158.</a:t>
+            </a:r>
+          </a:p>
+          <a:p>
+            <a:pPr>
+              <a:buFont typeface="Wingdings" panose="05000000000000000000" pitchFamily="2" charset="2"/>
+              <a:buChar char="v"/>
+            </a:pPr>
+            <a:r>
+              <a:rPr lang="en-IN" sz="1800" dirty="0" smtClean="0"/>
+              <a:t>For the balanced model, the accuracy has been found to be 70.5% .</a:t>
+            </a:r>
+          </a:p>
+          <a:p>
+            <a:pPr>
+              <a:buFont typeface="Wingdings" panose="05000000000000000000" pitchFamily="2" charset="2"/>
+              <a:buChar char="v"/>
+            </a:pPr>
+            <a:r>
               <a:rPr lang="en-IN" sz="1800" dirty="0"/>
-              <a:t>Plot 1</a:t>
-            </a:r>
+              <a:t> </a:t>
+            </a:r>
+            <a:r>
+              <a:rPr lang="en-IN" sz="1800" dirty="0" smtClean="0"/>
+              <a:t>KS statistic is a measure of the quality of a model. A KS stat value greater than 40 is indicative of a good stable model which is achieved by the model built.</a:t>
+            </a:r>
+          </a:p>
+          <a:p>
+            <a:pPr>
+              <a:buFont typeface="Wingdings" panose="05000000000000000000" pitchFamily="2" charset="2"/>
+              <a:buChar char="v"/>
+            </a:pPr>
+            <a:endParaRPr lang="en-IN" sz="1800" dirty="0" smtClean="0"/>
+          </a:p>
+          <a:p>
+            <a:pPr>
+              <a:buFont typeface="Wingdings" panose="05000000000000000000" pitchFamily="2" charset="2"/>
+              <a:buChar char="v"/>
+            </a:pPr>
+            <a:endParaRPr lang="en-IN" sz="1800" dirty="0"/>
           </a:p>
         </p:txBody>
       </p:sp>
@@ -4395,17 +4660,17 @@
           </a:xfrm>
         </p:spPr>
         <p:txBody>
-          <a:bodyPr/>
-          <a:lstStyle/>
-          <a:p>
-            <a:r>
-              <a:rPr lang="en-IN" b="1" dirty="0"/>
-              <a:t> </a:t>
-            </a:r>
-            <a:r>
-              <a:rPr lang="en-IN" sz="2800" dirty="0"/>
-              <a:t>&lt;Results&gt;</a:t>
-            </a:r>
+          <a:bodyPr>
+            <a:normAutofit/>
+          </a:bodyPr>
+          <a:lstStyle/>
+          <a:p>
+            <a:pPr algn="ctr"/>
+            <a:r>
+              <a:rPr lang="en-IN" sz="3200" dirty="0" smtClean="0"/>
+              <a:t>Model Evaluation</a:t>
+            </a:r>
+            <a:endParaRPr lang="en-IN" sz="2800" dirty="0"/>
           </a:p>
         </p:txBody>
       </p:sp>
@@ -4449,20 +4714,73 @@
             <p:ph idx="1"/>
           </p:nvPr>
         </p:nvSpPr>
-        <p:spPr/>
+        <p:spPr>
+          <a:xfrm>
+            <a:off x="404949" y="1854926"/>
+            <a:ext cx="5573820" cy="4344261"/>
+          </a:xfrm>
+        </p:spPr>
         <p:txBody>
           <a:bodyPr>
             <a:normAutofit/>
           </a:bodyPr>
           <a:lstStyle/>
           <a:p>
+            <a:pPr>
+              <a:buFont typeface="Wingdings" panose="05000000000000000000" pitchFamily="2" charset="2"/>
+              <a:buChar char="v"/>
+            </a:pPr>
+            <a:r>
+              <a:rPr lang="en-IN" sz="1800" dirty="0" smtClean="0"/>
+              <a:t>Gain chart gives a measure of the effectiveness of the model. </a:t>
+            </a:r>
+            <a:endParaRPr lang="en-IN" sz="1800" dirty="0"/>
+          </a:p>
+          <a:p>
+            <a:pPr>
+              <a:buFont typeface="Wingdings" panose="05000000000000000000" pitchFamily="2" charset="2"/>
+              <a:buChar char="v"/>
+            </a:pPr>
+            <a:r>
+              <a:rPr lang="en-IN" sz="1800" dirty="0" smtClean="0"/>
+              <a:t>With each decile, we can derive th</a:t>
+            </a:r>
+            <a:r>
+              <a:rPr lang="en-IN" sz="1800" dirty="0" smtClean="0"/>
+              <a:t>e percent of employees that can be accurately predicted for a positive attrition.</a:t>
+            </a:r>
+          </a:p>
+          <a:p>
+            <a:pPr>
+              <a:buFont typeface="Wingdings" panose="05000000000000000000" pitchFamily="2" charset="2"/>
+              <a:buChar char="v"/>
+            </a:pPr>
+            <a:r>
+              <a:rPr lang="en-IN" sz="1800" dirty="0" smtClean="0"/>
+              <a:t>From the gain chart, we can deduce that for the </a:t>
+            </a:r>
+            <a:r>
+              <a:rPr lang="en-IN" sz="1800" dirty="0" err="1" smtClean="0"/>
+              <a:t>the</a:t>
+            </a:r>
+            <a:r>
+              <a:rPr lang="en-IN" sz="1800" dirty="0" smtClean="0"/>
+              <a:t> 4</a:t>
+            </a:r>
+            <a:r>
+              <a:rPr lang="en-IN" sz="1800" baseline="30000" dirty="0" smtClean="0"/>
+              <a:t>th</a:t>
+            </a:r>
+            <a:r>
+              <a:rPr lang="en-IN" sz="1800" dirty="0" smtClean="0"/>
+              <a:t> decile, the percentage of accuracy of predicting the number of employees likely to undergo attrition is 73.71.</a:t>
+            </a:r>
+          </a:p>
+          <a:p>
             <a:pPr marL="0" indent="0">
               <a:buNone/>
             </a:pPr>
-            <a:r>
-              <a:rPr lang="en-IN" sz="1800" dirty="0"/>
-              <a:t>Plot 2</a:t>
-            </a:r>
+            <a:endParaRPr lang="en-IN" sz="1800" dirty="0" smtClean="0"/>
           </a:p>
         </p:txBody>
       </p:sp>
@@ -4483,20 +4801,50 @@
           </a:xfrm>
         </p:spPr>
         <p:txBody>
-          <a:bodyPr/>
-          <a:lstStyle/>
-          <a:p>
-            <a:r>
-              <a:rPr lang="en-IN" b="1" dirty="0"/>
-              <a:t> </a:t>
-            </a:r>
-            <a:r>
-              <a:rPr lang="en-IN" sz="2800" dirty="0"/>
-              <a:t>&lt;Results&gt;</a:t>
-            </a:r>
-          </a:p>
-        </p:txBody>
-      </p:sp>
+          <a:bodyPr>
+            <a:normAutofit/>
+          </a:bodyPr>
+          <a:lstStyle/>
+          <a:p>
+            <a:pPr algn="ctr"/>
+            <a:r>
+              <a:rPr lang="en-IN" sz="3200" dirty="0" smtClean="0"/>
+              <a:t>Gain Chart</a:t>
+            </a:r>
+            <a:endParaRPr lang="en-IN" sz="2800" dirty="0"/>
+          </a:p>
+        </p:txBody>
+      </p:sp>
+      <p:pic>
+        <p:nvPicPr>
+          <p:cNvPr id="2" name="Picture 1"/>
+          <p:cNvPicPr>
+            <a:picLocks noChangeAspect="1"/>
+          </p:cNvPicPr>
+          <p:nvPr/>
+        </p:nvPicPr>
+        <p:blipFill>
+          <a:blip r:embed="rId2">
+            <a:extLst>
+              <a:ext uri="{28A0092B-C50C-407E-A947-70E740481C1C}">
+                <a14:useLocalDpi xmlns:a14="http://schemas.microsoft.com/office/drawing/2010/main" val="0"/>
+              </a:ext>
+            </a:extLst>
+          </a:blip>
+          <a:stretch>
+            <a:fillRect/>
+          </a:stretch>
+        </p:blipFill>
+        <p:spPr>
+          <a:xfrm>
+            <a:off x="6561991" y="1951173"/>
+            <a:ext cx="4621823" cy="3956891"/>
+          </a:xfrm>
+          <a:prstGeom prst="rect">
+            <a:avLst/>
+          </a:prstGeom>
+        </p:spPr>
+      </p:pic>
     </p:spTree>
     <p:extLst>
       <p:ext uri="{BB962C8B-B14F-4D97-AF65-F5344CB8AC3E}">
@@ -4537,20 +4885,59 @@
             <p:ph idx="1"/>
           </p:nvPr>
         </p:nvSpPr>
-        <p:spPr/>
+        <p:spPr>
+          <a:xfrm>
+            <a:off x="404949" y="1854926"/>
+            <a:ext cx="5573820" cy="4344261"/>
+          </a:xfrm>
+        </p:spPr>
         <p:txBody>
           <a:bodyPr>
             <a:normAutofit/>
           </a:bodyPr>
           <a:lstStyle/>
           <a:p>
-            <a:pPr marL="0" indent="0">
-              <a:buNone/>
+            <a:pPr>
+              <a:buFont typeface="Wingdings" panose="05000000000000000000" pitchFamily="2" charset="2"/>
+              <a:buChar char="v"/>
             </a:pPr>
             <a:r>
-              <a:rPr lang="en-IN" sz="1800" dirty="0"/>
-              <a:t>Plot 3</a:t>
-            </a:r>
+              <a:rPr lang="en-IN" sz="1800" dirty="0" smtClean="0"/>
+              <a:t>Lift chart, tells us the ratio of gain chart for the R predicted model to the random model.</a:t>
+            </a:r>
+          </a:p>
+          <a:p>
+            <a:pPr>
+              <a:buFont typeface="Wingdings" panose="05000000000000000000" pitchFamily="2" charset="2"/>
+              <a:buChar char="v"/>
+            </a:pPr>
+            <a:r>
+              <a:rPr lang="en-IN" sz="1800" dirty="0" smtClean="0"/>
+              <a:t>It tells us how well R predicted model would predict as compared to a random generated model for a given decile.</a:t>
+            </a:r>
+          </a:p>
+          <a:p>
+            <a:pPr>
+              <a:buFont typeface="Wingdings" panose="05000000000000000000" pitchFamily="2" charset="2"/>
+              <a:buChar char="v"/>
+            </a:pPr>
+            <a:r>
+              <a:rPr lang="en-IN" sz="1800" dirty="0" smtClean="0"/>
+              <a:t>For the 4</a:t>
+            </a:r>
+            <a:r>
+              <a:rPr lang="en-IN" sz="1800" baseline="30000" dirty="0" smtClean="0"/>
+              <a:t>th</a:t>
+            </a:r>
+            <a:r>
+              <a:rPr lang="en-IN" sz="1800" dirty="0" smtClean="0"/>
+              <a:t> decile, the gain of the R generated model </a:t>
+            </a:r>
+            <a:r>
+              <a:rPr lang="en-IN" sz="1800" dirty="0" smtClean="0"/>
+              <a:t>predicts 1.84 times better. </a:t>
+            </a:r>
+            <a:endParaRPr lang="en-IN" sz="1800" dirty="0"/>
           </a:p>
         </p:txBody>
       </p:sp>
@@ -4571,20 +4958,50 @@
           </a:xfrm>
         </p:spPr>
         <p:txBody>
-          <a:bodyPr/>
-          <a:lstStyle/>
-          <a:p>
-            <a:r>
-              <a:rPr lang="en-IN" b="1" dirty="0"/>
-              <a:t> </a:t>
-            </a:r>
-            <a:r>
-              <a:rPr lang="en-IN" sz="2800" dirty="0"/>
-              <a:t>&lt;Results&gt;</a:t>
-            </a:r>
-          </a:p>
-        </p:txBody>
-      </p:sp>
+          <a:bodyPr>
+            <a:normAutofit/>
+          </a:bodyPr>
+          <a:lstStyle/>
+          <a:p>
+            <a:pPr algn="ctr"/>
+            <a:r>
+              <a:rPr lang="en-IN" sz="3200" dirty="0" smtClean="0"/>
+              <a:t>Lift Chart</a:t>
+            </a:r>
+            <a:endParaRPr lang="en-IN" sz="2000" dirty="0"/>
+          </a:p>
+        </p:txBody>
+      </p:sp>
+      <p:pic>
+        <p:nvPicPr>
+          <p:cNvPr id="2" name="Picture 1"/>
+          <p:cNvPicPr>
+            <a:picLocks noChangeAspect="1"/>
+          </p:cNvPicPr>
+          <p:nvPr/>
+        </p:nvPicPr>
+        <p:blipFill>
+          <a:blip r:embed="rId2">
+            <a:extLst>
+              <a:ext uri="{28A0092B-C50C-407E-A947-70E740481C1C}">
+                <a14:useLocalDpi xmlns:a14="http://schemas.microsoft.com/office/drawing/2010/main" val="0"/>
+              </a:ext>
+            </a:extLst>
+          </a:blip>
+          <a:stretch>
+            <a:fillRect/>
+          </a:stretch>
+        </p:blipFill>
+        <p:spPr>
+          <a:xfrm>
+            <a:off x="6562800" y="1951199"/>
+            <a:ext cx="4621250" cy="3956400"/>
+          </a:xfrm>
+          <a:prstGeom prst="rect">
+            <a:avLst/>
+          </a:prstGeom>
+        </p:spPr>
+      </p:pic>
     </p:spTree>
     <p:extLst>
       <p:ext uri="{BB962C8B-B14F-4D97-AF65-F5344CB8AC3E}">
@@ -4853,7 +5270,7 @@
   <a:extraClrSchemeLst/>
   <a:extLst>
     <a:ext uri="{05A4C25C-085E-4340-85A3-A5531E510DB2}">
-      <thm15:themeFamily xmlns="" xmlns:thm15="http://schemas.microsoft.com/office/thememl/2012/main" name="Office Theme" id="{62F939B6-93AF-4DB8-9C6B-D6C7DFDC589F}" vid="{4A3C46E8-61CC-4603-A589-7422A47A8E4A}"/>
+      <thm15:themeFamily xmlns:thm15="http://schemas.microsoft.com/office/thememl/2012/main" xmlns="" name="Office Theme" id="{62F939B6-93AF-4DB8-9C6B-D6C7DFDC589F}" vid="{4A3C46E8-61CC-4603-A589-7422A47A8E4A}"/>
     </a:ext>
   </a:extLst>
 </a:theme>
@@ -5148,7 +5565,7 @@
   <a:extraClrSchemeLst/>
   <a:extLst>
     <a:ext uri="{05A4C25C-085E-4340-85A3-A5531E510DB2}">
-      <thm15:themeFamily xmlns="" xmlns:thm15="http://schemas.microsoft.com/office/thememl/2012/main" name="Office Theme" id="{62F939B6-93AF-4DB8-9C6B-D6C7DFDC589F}" vid="{4A3C46E8-61CC-4603-A589-7422A47A8E4A}"/>
+      <thm15:themeFamily xmlns:thm15="http://schemas.microsoft.com/office/thememl/2012/main" xmlns="" name="Office Theme" id="{62F939B6-93AF-4DB8-9C6B-D6C7DFDC589F}" vid="{4A3C46E8-61CC-4603-A589-7422A47A8E4A}"/>
     </a:ext>
   </a:extLst>
 </a:theme>

</xml_diff>

<commit_message>
Made few grammatical changes and added confusion matrix and significant variables list
</commit_message>
<xml_diff>
--- a/HR Analytics Presentation.pptx
+++ b/HR Analytics Presentation.pptx
@@ -5,7 +5,7 @@
     <p:sldMasterId id="2147483660" r:id="rId1"/>
   </p:sldMasterIdLst>
   <p:notesMasterIdLst>
-    <p:notesMasterId r:id="rId12"/>
+    <p:notesMasterId r:id="rId13"/>
   </p:notesMasterIdLst>
   <p:sldIdLst>
     <p:sldId id="256" r:id="rId2"/>
@@ -14,10 +14,11 @@
     <p:sldId id="259" r:id="rId5"/>
     <p:sldId id="260" r:id="rId6"/>
     <p:sldId id="267" r:id="rId7"/>
-    <p:sldId id="262" r:id="rId8"/>
-    <p:sldId id="268" r:id="rId9"/>
-    <p:sldId id="269" r:id="rId10"/>
-    <p:sldId id="265" r:id="rId11"/>
+    <p:sldId id="270" r:id="rId8"/>
+    <p:sldId id="262" r:id="rId9"/>
+    <p:sldId id="268" r:id="rId10"/>
+    <p:sldId id="269" r:id="rId11"/>
+    <p:sldId id="265" r:id="rId12"/>
   </p:sldIdLst>
   <p:sldSz cx="12192000" cy="6858000"/>
   <p:notesSz cx="6858000" cy="9144000"/>
@@ -118,10 +119,10 @@
   </p:defaultTextStyle>
   <p:extLst>
     <p:ext uri="{EFAFB233-063F-42B5-8137-9DF3F51BA10A}">
-      <p15:sldGuideLst xmlns:p15="http://schemas.microsoft.com/office/powerpoint/2012/main" xmlns=""/>
+      <p15:sldGuideLst xmlns="" xmlns:p15="http://schemas.microsoft.com/office/powerpoint/2012/main"/>
     </p:ext>
     <p:ext uri="{2D200454-40CA-4A62-9FC3-DE9A4176ACB9}">
-      <p15:notesGuideLst xmlns:p15="http://schemas.microsoft.com/office/powerpoint/2012/main" xmlns=""/>
+      <p15:notesGuideLst xmlns="" xmlns:p15="http://schemas.microsoft.com/office/powerpoint/2012/main"/>
     </p:ext>
   </p:extLst>
 </p:presentation>
@@ -209,6 +210,7 @@
           <a:p>
             <a:fld id="{2E309023-AF2B-4043-B228-F191CADC9BB1}" type="datetimeFigureOut">
               <a:rPr lang="en-IN" smtClean="0"/>
+              <a:pPr/>
               <a:t>25-11-2018</a:t>
             </a:fld>
             <a:endParaRPr lang="en-IN"/>
@@ -368,6 +370,7 @@
           <a:p>
             <a:fld id="{5354517F-9C19-4E9A-AB98-AA89BD9F1D1D}" type="slidenum">
               <a:rPr lang="en-IN" smtClean="0"/>
+              <a:pPr/>
               <a:t>‹#›</a:t>
             </a:fld>
             <a:endParaRPr lang="en-IN"/>
@@ -377,7 +380,7 @@
     </p:spTree>
     <p:extLst>
       <p:ext uri="{BB962C8B-B14F-4D97-AF65-F5344CB8AC3E}">
-        <p14:creationId xmlns:p14="http://schemas.microsoft.com/office/powerpoint/2010/main" val="2867562135"/>
+        <p14:creationId xmlns:p14="http://schemas.microsoft.com/office/powerpoint/2010/main" xmlns="" val="2867562135"/>
       </p:ext>
     </p:extLst>
   </p:cSld>
@@ -608,6 +611,7 @@
           <a:p>
             <a:fld id="{70C018FE-C8D6-4A9C-A702-41F1E0C1C452}" type="datetimeFigureOut">
               <a:rPr lang="en-IN" smtClean="0"/>
+              <a:pPr/>
               <a:t>25-11-2018</a:t>
             </a:fld>
             <a:endParaRPr lang="en-IN"/>
@@ -650,6 +654,7 @@
           <a:p>
             <a:fld id="{B4FB9132-D0D3-4182-9F3A-A2B393A6FF16}" type="slidenum">
               <a:rPr lang="en-IN" smtClean="0"/>
+              <a:pPr/>
               <a:t>‹#›</a:t>
             </a:fld>
             <a:endParaRPr lang="en-IN"/>
@@ -659,7 +664,7 @@
     </p:spTree>
     <p:extLst>
       <p:ext uri="{BB962C8B-B14F-4D97-AF65-F5344CB8AC3E}">
-        <p14:creationId xmlns:p14="http://schemas.microsoft.com/office/powerpoint/2010/main" val="1446675276"/>
+        <p14:creationId xmlns:p14="http://schemas.microsoft.com/office/powerpoint/2010/main" xmlns="" val="1446675276"/>
       </p:ext>
     </p:extLst>
   </p:cSld>
@@ -778,6 +783,7 @@
           <a:p>
             <a:fld id="{70C018FE-C8D6-4A9C-A702-41F1E0C1C452}" type="datetimeFigureOut">
               <a:rPr lang="en-IN" smtClean="0"/>
+              <a:pPr/>
               <a:t>25-11-2018</a:t>
             </a:fld>
             <a:endParaRPr lang="en-IN"/>
@@ -820,6 +826,7 @@
           <a:p>
             <a:fld id="{B4FB9132-D0D3-4182-9F3A-A2B393A6FF16}" type="slidenum">
               <a:rPr lang="en-IN" smtClean="0"/>
+              <a:pPr/>
               <a:t>‹#›</a:t>
             </a:fld>
             <a:endParaRPr lang="en-IN"/>
@@ -829,7 +836,7 @@
     </p:spTree>
     <p:extLst>
       <p:ext uri="{BB962C8B-B14F-4D97-AF65-F5344CB8AC3E}">
-        <p14:creationId xmlns:p14="http://schemas.microsoft.com/office/powerpoint/2010/main" val="1725356468"/>
+        <p14:creationId xmlns:p14="http://schemas.microsoft.com/office/powerpoint/2010/main" xmlns="" val="1725356468"/>
       </p:ext>
     </p:extLst>
   </p:cSld>
@@ -958,6 +965,7 @@
           <a:p>
             <a:fld id="{70C018FE-C8D6-4A9C-A702-41F1E0C1C452}" type="datetimeFigureOut">
               <a:rPr lang="en-IN" smtClean="0"/>
+              <a:pPr/>
               <a:t>25-11-2018</a:t>
             </a:fld>
             <a:endParaRPr lang="en-IN"/>
@@ -1000,6 +1008,7 @@
           <a:p>
             <a:fld id="{B4FB9132-D0D3-4182-9F3A-A2B393A6FF16}" type="slidenum">
               <a:rPr lang="en-IN" smtClean="0"/>
+              <a:pPr/>
               <a:t>‹#›</a:t>
             </a:fld>
             <a:endParaRPr lang="en-IN"/>
@@ -1009,7 +1018,7 @@
     </p:spTree>
     <p:extLst>
       <p:ext uri="{BB962C8B-B14F-4D97-AF65-F5344CB8AC3E}">
-        <p14:creationId xmlns:p14="http://schemas.microsoft.com/office/powerpoint/2010/main" val="1927597908"/>
+        <p14:creationId xmlns:p14="http://schemas.microsoft.com/office/powerpoint/2010/main" xmlns="" val="1927597908"/>
       </p:ext>
     </p:extLst>
   </p:cSld>
@@ -1195,7 +1204,7 @@
     </p:spTree>
     <p:extLst>
       <p:ext uri="{BB962C8B-B14F-4D97-AF65-F5344CB8AC3E}">
-        <p14:creationId xmlns:p14="http://schemas.microsoft.com/office/powerpoint/2010/main" val="1375848570"/>
+        <p14:creationId xmlns:p14="http://schemas.microsoft.com/office/powerpoint/2010/main" xmlns="" val="1375848570"/>
       </p:ext>
     </p:extLst>
   </p:cSld>
@@ -1390,6 +1399,7 @@
           <a:p>
             <a:fld id="{70C018FE-C8D6-4A9C-A702-41F1E0C1C452}" type="datetimeFigureOut">
               <a:rPr lang="en-IN" smtClean="0"/>
+              <a:pPr/>
               <a:t>25-11-2018</a:t>
             </a:fld>
             <a:endParaRPr lang="en-IN"/>
@@ -1432,6 +1442,7 @@
           <a:p>
             <a:fld id="{B4FB9132-D0D3-4182-9F3A-A2B393A6FF16}" type="slidenum">
               <a:rPr lang="en-IN" smtClean="0"/>
+              <a:pPr/>
               <a:t>‹#›</a:t>
             </a:fld>
             <a:endParaRPr lang="en-IN"/>
@@ -1441,7 +1452,7 @@
     </p:spTree>
     <p:extLst>
       <p:ext uri="{BB962C8B-B14F-4D97-AF65-F5344CB8AC3E}">
-        <p14:creationId xmlns:p14="http://schemas.microsoft.com/office/powerpoint/2010/main" val="3420441129"/>
+        <p14:creationId xmlns:p14="http://schemas.microsoft.com/office/powerpoint/2010/main" xmlns="" val="3420441129"/>
       </p:ext>
     </p:extLst>
   </p:cSld>
@@ -1622,6 +1633,7 @@
           <a:p>
             <a:fld id="{70C018FE-C8D6-4A9C-A702-41F1E0C1C452}" type="datetimeFigureOut">
               <a:rPr lang="en-IN" smtClean="0"/>
+              <a:pPr/>
               <a:t>25-11-2018</a:t>
             </a:fld>
             <a:endParaRPr lang="en-IN"/>
@@ -1664,6 +1676,7 @@
           <a:p>
             <a:fld id="{B4FB9132-D0D3-4182-9F3A-A2B393A6FF16}" type="slidenum">
               <a:rPr lang="en-IN" smtClean="0"/>
+              <a:pPr/>
               <a:t>‹#›</a:t>
             </a:fld>
             <a:endParaRPr lang="en-IN"/>
@@ -1673,7 +1686,7 @@
     </p:spTree>
     <p:extLst>
       <p:ext uri="{BB962C8B-B14F-4D97-AF65-F5344CB8AC3E}">
-        <p14:creationId xmlns:p14="http://schemas.microsoft.com/office/powerpoint/2010/main" val="3026578523"/>
+        <p14:creationId xmlns:p14="http://schemas.microsoft.com/office/powerpoint/2010/main" xmlns="" val="3026578523"/>
       </p:ext>
     </p:extLst>
   </p:cSld>
@@ -1989,6 +2002,7 @@
           <a:p>
             <a:fld id="{70C018FE-C8D6-4A9C-A702-41F1E0C1C452}" type="datetimeFigureOut">
               <a:rPr lang="en-IN" smtClean="0"/>
+              <a:pPr/>
               <a:t>25-11-2018</a:t>
             </a:fld>
             <a:endParaRPr lang="en-IN"/>
@@ -2031,6 +2045,7 @@
           <a:p>
             <a:fld id="{B4FB9132-D0D3-4182-9F3A-A2B393A6FF16}" type="slidenum">
               <a:rPr lang="en-IN" smtClean="0"/>
+              <a:pPr/>
               <a:t>‹#›</a:t>
             </a:fld>
             <a:endParaRPr lang="en-IN"/>
@@ -2040,7 +2055,7 @@
     </p:spTree>
     <p:extLst>
       <p:ext uri="{BB962C8B-B14F-4D97-AF65-F5344CB8AC3E}">
-        <p14:creationId xmlns:p14="http://schemas.microsoft.com/office/powerpoint/2010/main" val="3845587079"/>
+        <p14:creationId xmlns:p14="http://schemas.microsoft.com/office/powerpoint/2010/main" xmlns="" val="3845587079"/>
       </p:ext>
     </p:extLst>
   </p:cSld>
@@ -2107,6 +2122,7 @@
           <a:p>
             <a:fld id="{70C018FE-C8D6-4A9C-A702-41F1E0C1C452}" type="datetimeFigureOut">
               <a:rPr lang="en-IN" smtClean="0"/>
+              <a:pPr/>
               <a:t>25-11-2018</a:t>
             </a:fld>
             <a:endParaRPr lang="en-IN"/>
@@ -2149,6 +2165,7 @@
           <a:p>
             <a:fld id="{B4FB9132-D0D3-4182-9F3A-A2B393A6FF16}" type="slidenum">
               <a:rPr lang="en-IN" smtClean="0"/>
+              <a:pPr/>
               <a:t>‹#›</a:t>
             </a:fld>
             <a:endParaRPr lang="en-IN"/>
@@ -2158,7 +2175,7 @@
     </p:spTree>
     <p:extLst>
       <p:ext uri="{BB962C8B-B14F-4D97-AF65-F5344CB8AC3E}">
-        <p14:creationId xmlns:p14="http://schemas.microsoft.com/office/powerpoint/2010/main" val="2173476234"/>
+        <p14:creationId xmlns:p14="http://schemas.microsoft.com/office/powerpoint/2010/main" xmlns="" val="2173476234"/>
       </p:ext>
     </p:extLst>
   </p:cSld>
@@ -2202,6 +2219,7 @@
           <a:p>
             <a:fld id="{70C018FE-C8D6-4A9C-A702-41F1E0C1C452}" type="datetimeFigureOut">
               <a:rPr lang="en-IN" smtClean="0"/>
+              <a:pPr/>
               <a:t>25-11-2018</a:t>
             </a:fld>
             <a:endParaRPr lang="en-IN"/>
@@ -2244,6 +2262,7 @@
           <a:p>
             <a:fld id="{B4FB9132-D0D3-4182-9F3A-A2B393A6FF16}" type="slidenum">
               <a:rPr lang="en-IN" smtClean="0"/>
+              <a:pPr/>
               <a:t>‹#›</a:t>
             </a:fld>
             <a:endParaRPr lang="en-IN"/>
@@ -2253,7 +2272,7 @@
     </p:spTree>
     <p:extLst>
       <p:ext uri="{BB962C8B-B14F-4D97-AF65-F5344CB8AC3E}">
-        <p14:creationId xmlns:p14="http://schemas.microsoft.com/office/powerpoint/2010/main" val="1279458004"/>
+        <p14:creationId xmlns:p14="http://schemas.microsoft.com/office/powerpoint/2010/main" xmlns="" val="1279458004"/>
       </p:ext>
     </p:extLst>
   </p:cSld>
@@ -2478,6 +2497,7 @@
           <a:p>
             <a:fld id="{70C018FE-C8D6-4A9C-A702-41F1E0C1C452}" type="datetimeFigureOut">
               <a:rPr lang="en-IN" smtClean="0"/>
+              <a:pPr/>
               <a:t>25-11-2018</a:t>
             </a:fld>
             <a:endParaRPr lang="en-IN"/>
@@ -2520,6 +2540,7 @@
           <a:p>
             <a:fld id="{B4FB9132-D0D3-4182-9F3A-A2B393A6FF16}" type="slidenum">
               <a:rPr lang="en-IN" smtClean="0"/>
+              <a:pPr/>
               <a:t>‹#›</a:t>
             </a:fld>
             <a:endParaRPr lang="en-IN"/>
@@ -2529,7 +2550,7 @@
     </p:spTree>
     <p:extLst>
       <p:ext uri="{BB962C8B-B14F-4D97-AF65-F5344CB8AC3E}">
-        <p14:creationId xmlns:p14="http://schemas.microsoft.com/office/powerpoint/2010/main" val="3104558352"/>
+        <p14:creationId xmlns:p14="http://schemas.microsoft.com/office/powerpoint/2010/main" xmlns="" val="3104558352"/>
       </p:ext>
     </p:extLst>
   </p:cSld>
@@ -2735,6 +2756,7 @@
           <a:p>
             <a:fld id="{70C018FE-C8D6-4A9C-A702-41F1E0C1C452}" type="datetimeFigureOut">
               <a:rPr lang="en-IN" smtClean="0"/>
+              <a:pPr/>
               <a:t>25-11-2018</a:t>
             </a:fld>
             <a:endParaRPr lang="en-IN"/>
@@ -2777,6 +2799,7 @@
           <a:p>
             <a:fld id="{B4FB9132-D0D3-4182-9F3A-A2B393A6FF16}" type="slidenum">
               <a:rPr lang="en-IN" smtClean="0"/>
+              <a:pPr/>
               <a:t>‹#›</a:t>
             </a:fld>
             <a:endParaRPr lang="en-IN"/>
@@ -2786,7 +2809,7 @@
     </p:spTree>
     <p:extLst>
       <p:ext uri="{BB962C8B-B14F-4D97-AF65-F5344CB8AC3E}">
-        <p14:creationId xmlns:p14="http://schemas.microsoft.com/office/powerpoint/2010/main" val="4086360930"/>
+        <p14:creationId xmlns:p14="http://schemas.microsoft.com/office/powerpoint/2010/main" xmlns="" val="4086360930"/>
       </p:ext>
     </p:extLst>
   </p:cSld>
@@ -2946,6 +2969,7 @@
           <a:p>
             <a:fld id="{70C018FE-C8D6-4A9C-A702-41F1E0C1C452}" type="datetimeFigureOut">
               <a:rPr lang="en-IN" smtClean="0"/>
+              <a:pPr/>
               <a:t>25-11-2018</a:t>
             </a:fld>
             <a:endParaRPr lang="en-IN" dirty="0"/>
@@ -3044,7 +3068,7 @@
           <a:blip r:embed="rId13" cstate="print">
             <a:extLst>
               <a:ext uri="{28A0092B-C50C-407E-A947-70E740481C1C}">
-                <a14:useLocalDpi xmlns:a14="http://schemas.microsoft.com/office/drawing/2010/main" val="0"/>
+                <a14:useLocalDpi xmlns:a14="http://schemas.microsoft.com/office/drawing/2010/main" xmlns="" val="0"/>
               </a:ext>
             </a:extLst>
           </a:blip>
@@ -3074,7 +3098,7 @@
           <a:blip r:embed="rId14">
             <a:extLst>
               <a:ext uri="{BEBA8EAE-BF5A-486C-A8C5-ECC9F3942E4B}">
-                <a14:imgProps xmlns:a14="http://schemas.microsoft.com/office/drawing/2010/main">
+                <a14:imgProps xmlns:a14="http://schemas.microsoft.com/office/drawing/2010/main" xmlns="">
                   <a14:imgLayer r:embed="rId15">
                     <a14:imgEffect>
                       <a14:backgroundRemoval t="535" b="100000" l="0" r="100000">
@@ -3097,7 +3121,7 @@
                 </a14:imgProps>
               </a:ext>
               <a:ext uri="{28A0092B-C50C-407E-A947-70E740481C1C}">
-                <a14:useLocalDpi xmlns:a14="http://schemas.microsoft.com/office/drawing/2010/main" val="0"/>
+                <a14:useLocalDpi xmlns:a14="http://schemas.microsoft.com/office/drawing/2010/main" xmlns="" val="0"/>
               </a:ext>
             </a:extLst>
           </a:blip>
@@ -3118,7 +3142,7 @@
     </p:spTree>
     <p:extLst>
       <p:ext uri="{BB962C8B-B14F-4D97-AF65-F5344CB8AC3E}">
-        <p14:creationId xmlns:p14="http://schemas.microsoft.com/office/powerpoint/2010/main" val="3153534456"/>
+        <p14:creationId xmlns:p14="http://schemas.microsoft.com/office/powerpoint/2010/main" xmlns="" val="3153534456"/>
       </p:ext>
     </p:extLst>
   </p:cSld>
@@ -3611,7 +3635,7 @@
     </p:spTree>
     <p:extLst>
       <p:ext uri="{BB962C8B-B14F-4D97-AF65-F5344CB8AC3E}">
-        <p14:creationId xmlns:p14="http://schemas.microsoft.com/office/powerpoint/2010/main" val="3414739867"/>
+        <p14:creationId xmlns:p14="http://schemas.microsoft.com/office/powerpoint/2010/main" xmlns="" val="3414739867"/>
       </p:ext>
     </p:extLst>
   </p:cSld>
@@ -3648,7 +3672,12 @@
             <p:ph idx="1"/>
           </p:nvPr>
         </p:nvSpPr>
-        <p:spPr/>
+        <p:spPr>
+          <a:xfrm>
+            <a:off x="404949" y="1854926"/>
+            <a:ext cx="5573820" cy="4344261"/>
+          </a:xfrm>
+        </p:spPr>
         <p:txBody>
           <a:bodyPr>
             <a:normAutofit/>
@@ -3660,8 +3689,8 @@
               <a:buChar char="v"/>
             </a:pPr>
             <a:r>
-              <a:rPr lang="en-IN" sz="1600" dirty="0" smtClean="0"/>
-              <a:t>The KS statistics value for the generated model is 41.7.</a:t>
+              <a:rPr lang="en-IN" sz="1800" dirty="0" smtClean="0"/>
+              <a:t>Lift chart, tells us the ratio of gain chart for the R predicted model to the random model.</a:t>
             </a:r>
           </a:p>
           <a:p>
@@ -3670,8 +3699,8 @@
               <a:buChar char="v"/>
             </a:pPr>
             <a:r>
-              <a:rPr lang="en-IN" sz="1600" dirty="0" smtClean="0"/>
-              <a:t>Both the gain and lift chart values predict a fair amount of employees leaving the company which is again verified by a good KS statistic value. </a:t>
+              <a:rPr lang="en-IN" sz="1800" dirty="0" smtClean="0"/>
+              <a:t>It tells us how well R predicted model would predict as compared to a random generated model for a given decile.</a:t>
             </a:r>
           </a:p>
           <a:p>
@@ -3680,15 +3709,76 @@
               <a:buChar char="v"/>
             </a:pPr>
             <a:r>
-              <a:rPr lang="en-IN" sz="1600" dirty="0" smtClean="0"/>
-              <a:t>From the overall model accuracy of 70.5% , the KS statistic value and the gain and lift charts, the model is evaluated to be performing well in predicting the attrition of the employees.</a:t>
-            </a:r>
-          </a:p>
-        </p:txBody>
-      </p:sp>
-      <p:sp>
-        <p:nvSpPr>
-          <p:cNvPr id="5" name="Title 1"/>
+              <a:rPr lang="en-IN" sz="1800" dirty="0" smtClean="0"/>
+              <a:t>For the </a:t>
+            </a:r>
+            <a:r>
+              <a:rPr lang="en-IN" sz="1800" dirty="0" smtClean="0"/>
+              <a:t>1</a:t>
+            </a:r>
+            <a:r>
+              <a:rPr lang="en-IN" sz="1800" baseline="30000" dirty="0" smtClean="0"/>
+              <a:t>st</a:t>
+            </a:r>
+            <a:r>
+              <a:rPr lang="en-IN" sz="1800" dirty="0" smtClean="0"/>
+              <a:t> </a:t>
+            </a:r>
+            <a:r>
+              <a:rPr lang="en-IN" sz="1800" dirty="0" err="1" smtClean="0"/>
+              <a:t>decile</a:t>
+            </a:r>
+            <a:r>
+              <a:rPr lang="en-IN" sz="1800" dirty="0" smtClean="0"/>
+              <a:t>, the gain of the R generated model predicts </a:t>
+            </a:r>
+            <a:r>
+              <a:rPr lang="en-IN" sz="1800" dirty="0" smtClean="0"/>
+              <a:t>3.33</a:t>
+            </a:r>
+            <a:r>
+              <a:rPr lang="en-IN" sz="1800" dirty="0" smtClean="0"/>
+              <a:t> </a:t>
+            </a:r>
+            <a:r>
+              <a:rPr lang="en-IN" sz="1800" dirty="0" smtClean="0"/>
+              <a:t>times </a:t>
+            </a:r>
+            <a:r>
+              <a:rPr lang="en-IN" sz="1800" dirty="0" smtClean="0"/>
+              <a:t>better, for the 2</a:t>
+            </a:r>
+            <a:r>
+              <a:rPr lang="en-IN" sz="1800" baseline="30000" dirty="0" smtClean="0"/>
+              <a:t>nd</a:t>
+            </a:r>
+            <a:r>
+              <a:rPr lang="en-IN" sz="1800" dirty="0" smtClean="0"/>
+              <a:t> 2.49 times, for 3</a:t>
+            </a:r>
+            <a:r>
+              <a:rPr lang="en-IN" sz="1800" baseline="30000" dirty="0" smtClean="0"/>
+              <a:t>rd</a:t>
+            </a:r>
+            <a:r>
+              <a:rPr lang="en-IN" sz="1800" dirty="0" smtClean="0"/>
+              <a:t> 2.13 times and for 4</a:t>
+            </a:r>
+            <a:r>
+              <a:rPr lang="en-IN" sz="1800" baseline="30000" dirty="0" smtClean="0"/>
+              <a:t>th</a:t>
+            </a:r>
+            <a:r>
+              <a:rPr lang="en-IN" sz="1800" dirty="0" smtClean="0"/>
+              <a:t> decile,1.84 times better. </a:t>
+            </a:r>
+            <a:endParaRPr lang="en-IN" sz="1800" dirty="0"/>
+          </a:p>
+        </p:txBody>
+      </p:sp>
+      <p:sp>
+        <p:nvSpPr>
+          <p:cNvPr id="6" name="Title 1"/>
           <p:cNvSpPr>
             <a:spLocks noGrp="1"/>
           </p:cNvSpPr>
@@ -3711,16 +3801,197 @@
             <a:pPr algn="ctr"/>
             <a:r>
               <a:rPr lang="en-IN" sz="3200" dirty="0" smtClean="0"/>
-              <a:t>Conclusions</a:t>
-            </a:r>
-            <a:endParaRPr lang="en-IN" sz="3200" dirty="0"/>
-          </a:p>
-        </p:txBody>
-      </p:sp>
+              <a:t>Lift Chart</a:t>
+            </a:r>
+            <a:endParaRPr lang="en-IN" sz="2000" dirty="0"/>
+          </a:p>
+        </p:txBody>
+      </p:sp>
+      <p:pic>
+        <p:nvPicPr>
+          <p:cNvPr id="2" name="Picture 1"/>
+          <p:cNvPicPr>
+            <a:picLocks noChangeAspect="1"/>
+          </p:cNvPicPr>
+          <p:nvPr/>
+        </p:nvPicPr>
+        <p:blipFill>
+          <a:blip r:embed="rId2">
+            <a:extLst>
+              <a:ext uri="{28A0092B-C50C-407E-A947-70E740481C1C}">
+                <a14:useLocalDpi xmlns:a14="http://schemas.microsoft.com/office/drawing/2010/main" xmlns="" val="0"/>
+              </a:ext>
+            </a:extLst>
+          </a:blip>
+          <a:stretch>
+            <a:fillRect/>
+          </a:stretch>
+        </p:blipFill>
+        <p:spPr>
+          <a:xfrm>
+            <a:off x="6562800" y="1951199"/>
+            <a:ext cx="4621250" cy="3956400"/>
+          </a:xfrm>
+          <a:prstGeom prst="rect">
+            <a:avLst/>
+          </a:prstGeom>
+        </p:spPr>
+      </p:pic>
     </p:spTree>
     <p:extLst>
       <p:ext uri="{BB962C8B-B14F-4D97-AF65-F5344CB8AC3E}">
-        <p14:creationId xmlns:p14="http://schemas.microsoft.com/office/powerpoint/2010/main" val="1399706687"/>
+        <p14:creationId xmlns:p14="http://schemas.microsoft.com/office/powerpoint/2010/main" xmlns="" val="1057818561"/>
+      </p:ext>
+    </p:extLst>
+  </p:cSld>
+  <p:clrMapOvr>
+    <a:masterClrMapping/>
+  </p:clrMapOvr>
+</p:sld>
+</file>
+
+<file path=ppt/slides/slide11.xml><?xml version="1.0" encoding="utf-8"?>
+<p:sld xmlns:a="http://schemas.openxmlformats.org/drawingml/2006/main" xmlns:r="http://schemas.openxmlformats.org/officeDocument/2006/relationships" xmlns:p="http://schemas.openxmlformats.org/presentationml/2006/main">
+  <p:cSld>
+    <p:spTree>
+      <p:nvGrpSpPr>
+        <p:cNvPr id="1" name=""/>
+        <p:cNvGrpSpPr/>
+        <p:nvPr/>
+      </p:nvGrpSpPr>
+      <p:grpSpPr>
+        <a:xfrm>
+          <a:off x="0" y="0"/>
+          <a:ext cx="0" cy="0"/>
+          <a:chOff x="0" y="0"/>
+          <a:chExt cx="0" cy="0"/>
+        </a:xfrm>
+      </p:grpSpPr>
+      <p:sp>
+        <p:nvSpPr>
+          <p:cNvPr id="3" name="Content Placeholder 2"/>
+          <p:cNvSpPr>
+            <a:spLocks noGrp="1"/>
+          </p:cNvSpPr>
+          <p:nvPr>
+            <p:ph idx="1"/>
+          </p:nvPr>
+        </p:nvSpPr>
+        <p:spPr/>
+        <p:txBody>
+          <a:bodyPr>
+            <a:normAutofit/>
+          </a:bodyPr>
+          <a:lstStyle/>
+          <a:p>
+            <a:pPr>
+              <a:buFont typeface="Wingdings" panose="05000000000000000000" pitchFamily="2" charset="2"/>
+              <a:buChar char="v"/>
+            </a:pPr>
+            <a:r>
+              <a:rPr lang="en-US" sz="1600" dirty="0" smtClean="0"/>
+              <a:t>Our model is 71.4% successful in predicting the actual churners correctly, which was the target of building this model. The predicted churners can be targeted by administration with different marketing strategies to help them retain.</a:t>
+            </a:r>
+            <a:endParaRPr lang="en-IN" sz="1600" dirty="0" smtClean="0"/>
+          </a:p>
+          <a:p>
+            <a:pPr>
+              <a:buFont typeface="Wingdings" panose="05000000000000000000" pitchFamily="2" charset="2"/>
+              <a:buChar char="v"/>
+            </a:pPr>
+            <a:r>
+              <a:rPr lang="en-IN" sz="1600" dirty="0" smtClean="0"/>
+              <a:t>Both </a:t>
+            </a:r>
+            <a:r>
+              <a:rPr lang="en-IN" sz="1600" dirty="0" smtClean="0"/>
+              <a:t>the gain and lift </a:t>
+            </a:r>
+            <a:r>
+              <a:rPr lang="en-IN" sz="1600" dirty="0" smtClean="0"/>
+              <a:t>charts signify </a:t>
+            </a:r>
+            <a:r>
+              <a:rPr lang="en-IN" sz="1600" dirty="0" smtClean="0"/>
+              <a:t>that the</a:t>
+            </a:r>
+            <a:r>
+              <a:rPr lang="en-IN" sz="1600" dirty="0" smtClean="0"/>
+              <a:t> predicted amount </a:t>
+            </a:r>
+            <a:r>
+              <a:rPr lang="en-IN" sz="1600" dirty="0" smtClean="0"/>
+              <a:t>of employees leaving the </a:t>
+            </a:r>
+            <a:r>
+              <a:rPr lang="en-IN" sz="1600" dirty="0" smtClean="0"/>
+              <a:t>company is fairly correct and </a:t>
+            </a:r>
+            <a:r>
+              <a:rPr lang="en-IN" sz="1600" dirty="0" smtClean="0"/>
+              <a:t>which is again verified by a good KS statistic value. </a:t>
+            </a:r>
+          </a:p>
+          <a:p>
+            <a:pPr>
+              <a:buFont typeface="Wingdings" panose="05000000000000000000" pitchFamily="2" charset="2"/>
+              <a:buChar char="v"/>
+            </a:pPr>
+            <a:r>
+              <a:rPr lang="en-IN" sz="1600" dirty="0" smtClean="0"/>
+              <a:t>The overall achieved </a:t>
+            </a:r>
+            <a:r>
+              <a:rPr lang="en-IN" sz="1600" dirty="0" smtClean="0"/>
+              <a:t>model accuracy of 70.5% , </a:t>
+            </a:r>
+            <a:r>
+              <a:rPr lang="en-IN" sz="1600" dirty="0" smtClean="0"/>
+              <a:t>high sensitivity and specificity say that the significant variables selected, are statistically and intuitively correct in case of </a:t>
+            </a:r>
+            <a:r>
+              <a:rPr lang="en-IN" sz="1600" smtClean="0"/>
+              <a:t>predicting attritions. </a:t>
+            </a:r>
+            <a:endParaRPr lang="en-IN" sz="1600" dirty="0" smtClean="0"/>
+          </a:p>
+        </p:txBody>
+      </p:sp>
+      <p:sp>
+        <p:nvSpPr>
+          <p:cNvPr id="5" name="Title 1"/>
+          <p:cNvSpPr>
+            <a:spLocks noGrp="1"/>
+          </p:cNvSpPr>
+          <p:nvPr>
+            <p:ph type="title"/>
+          </p:nvPr>
+        </p:nvSpPr>
+        <p:spPr>
+          <a:xfrm>
+            <a:off x="1136469" y="640080"/>
+            <a:ext cx="9313817" cy="856138"/>
+          </a:xfrm>
+        </p:spPr>
+        <p:txBody>
+          <a:bodyPr>
+            <a:normAutofit/>
+          </a:bodyPr>
+          <a:lstStyle/>
+          <a:p>
+            <a:pPr algn="ctr"/>
+            <a:r>
+              <a:rPr lang="en-IN" sz="3200" dirty="0" smtClean="0"/>
+              <a:t>Conclusions</a:t>
+            </a:r>
+            <a:endParaRPr lang="en-IN" sz="3200" dirty="0"/>
+          </a:p>
+        </p:txBody>
+      </p:sp>
+    </p:spTree>
+    <p:extLst>
+      <p:ext uri="{BB962C8B-B14F-4D97-AF65-F5344CB8AC3E}">
+        <p14:creationId xmlns:p14="http://schemas.microsoft.com/office/powerpoint/2010/main" xmlns="" val="1399706687"/>
       </p:ext>
     </p:extLst>
   </p:cSld>
@@ -3913,7 +4184,7 @@
     </p:spTree>
     <p:extLst>
       <p:ext uri="{BB962C8B-B14F-4D97-AF65-F5344CB8AC3E}">
-        <p14:creationId xmlns:p14="http://schemas.microsoft.com/office/powerpoint/2010/main" val="3869754742"/>
+        <p14:creationId xmlns:p14="http://schemas.microsoft.com/office/powerpoint/2010/main" xmlns="" val="3869754742"/>
       </p:ext>
     </p:extLst>
   </p:cSld>
@@ -4063,7 +4334,7 @@
     </p:spTree>
     <p:extLst>
       <p:ext uri="{BB962C8B-B14F-4D97-AF65-F5344CB8AC3E}">
-        <p14:creationId xmlns:p14="http://schemas.microsoft.com/office/powerpoint/2010/main" val="2118598445"/>
+        <p14:creationId xmlns:p14="http://schemas.microsoft.com/office/powerpoint/2010/main" xmlns="" val="2118598445"/>
       </p:ext>
     </p:extLst>
   </p:cSld>
@@ -4159,7 +4430,15 @@
             </a:pPr>
             <a:r>
               <a:rPr lang="en-IN" sz="1800" dirty="0" smtClean="0"/>
-              <a:t>The missing values have been removed with the highest frequency values.</a:t>
+              <a:t>The missing values have been </a:t>
+            </a:r>
+            <a:r>
+              <a:rPr lang="en-IN" sz="1800" dirty="0" smtClean="0"/>
+              <a:t>replaced </a:t>
+            </a:r>
+            <a:r>
+              <a:rPr lang="en-IN" sz="1800" dirty="0" smtClean="0"/>
+              <a:t>with the highest frequency values.</a:t>
             </a:r>
           </a:p>
           <a:p>
@@ -4214,7 +4493,7 @@
     </p:spTree>
     <p:extLst>
       <p:ext uri="{BB962C8B-B14F-4D97-AF65-F5344CB8AC3E}">
-        <p14:creationId xmlns:p14="http://schemas.microsoft.com/office/powerpoint/2010/main" val="3095347154"/>
+        <p14:creationId xmlns:p14="http://schemas.microsoft.com/office/powerpoint/2010/main" xmlns="" val="3095347154"/>
       </p:ext>
     </p:extLst>
   </p:cSld>
@@ -4339,11 +4618,7 @@
             </a:r>
             <a:r>
               <a:rPr lang="en-IN" sz="1800" dirty="0" smtClean="0"/>
-              <a:t> to compute store the result of average hours spent by each employee on the job per month</a:t>
-            </a:r>
-            <a:r>
-              <a:rPr lang="en-IN" sz="1800" dirty="0" smtClean="0"/>
-              <a:t>.</a:t>
+              <a:t> to compute store the result of average hours spent by each employee on the job per month.</a:t>
             </a:r>
           </a:p>
           <a:p>
@@ -4371,7 +4646,6 @@
               <a:rPr lang="en-IN" sz="1800" dirty="0" smtClean="0"/>
               <a:t>.</a:t>
             </a:r>
-            <a:endParaRPr lang="en-IN" sz="1800" dirty="0" smtClean="0"/>
           </a:p>
           <a:p>
             <a:pPr marL="800100" lvl="1" indent="-342900">
@@ -4411,7 +4685,7 @@
     </p:spTree>
     <p:extLst>
       <p:ext uri="{BB962C8B-B14F-4D97-AF65-F5344CB8AC3E}">
-        <p14:creationId xmlns:p14="http://schemas.microsoft.com/office/powerpoint/2010/main" val="1302983225"/>
+        <p14:creationId xmlns:p14="http://schemas.microsoft.com/office/powerpoint/2010/main" xmlns="" val="1302983225"/>
       </p:ext>
     </p:extLst>
   </p:cSld>
@@ -4497,11 +4771,19 @@
             </a:pPr>
             <a:r>
               <a:rPr lang="en-IN" sz="1800" dirty="0" smtClean="0"/>
-              <a:t>For all th</a:t>
-            </a:r>
-            <a:r>
-              <a:rPr lang="en-IN" sz="1800" dirty="0" smtClean="0"/>
-              <a:t>e models created, the number of significant variables, AIC values and the </a:t>
+              <a:t>For all the models created, the number of significant variables, </a:t>
+            </a:r>
+            <a:r>
+              <a:rPr lang="en-IN" sz="1800" dirty="0" smtClean="0"/>
+              <a:t>p values</a:t>
+            </a:r>
+            <a:r>
+              <a:rPr lang="en-IN" sz="1800" dirty="0" smtClean="0"/>
+              <a:t> </a:t>
+            </a:r>
+            <a:r>
+              <a:rPr lang="en-IN" sz="1800" dirty="0" smtClean="0"/>
+              <a:t>and the </a:t>
             </a:r>
             <a:r>
               <a:rPr lang="en-IN" sz="1800" dirty="0" err="1" smtClean="0"/>
@@ -4523,7 +4805,15 @@
             </a:r>
             <a:r>
               <a:rPr lang="en-IN" sz="1800" dirty="0" smtClean="0"/>
-              <a:t>The most optimal model has 12 significant variables with </a:t>
+              <a:t>The most optimal model has </a:t>
+            </a:r>
+            <a:r>
+              <a:rPr lang="en-IN" sz="1800" dirty="0" smtClean="0"/>
+              <a:t>11 </a:t>
+            </a:r>
+            <a:r>
+              <a:rPr lang="en-IN" sz="1800" dirty="0" smtClean="0"/>
+              <a:t>significant variables with </a:t>
             </a:r>
             <a:r>
               <a:rPr lang="en-IN" sz="1800" dirty="0" err="1" smtClean="0"/>
@@ -4531,16 +4821,23 @@
             </a:r>
             <a:r>
               <a:rPr lang="en-IN" sz="1800" dirty="0" smtClean="0"/>
-              <a:t> values for each variable less than 2( as per business standards).</a:t>
-            </a:r>
-            <a:endParaRPr lang="en-IN" sz="1800" dirty="0" smtClean="0"/>
+              <a:t> values for each variable less than </a:t>
+            </a:r>
+            <a:r>
+              <a:rPr lang="en-IN" sz="1800" dirty="0" smtClean="0"/>
+              <a:t>2 (as </a:t>
+            </a:r>
+            <a:r>
+              <a:rPr lang="en-IN" sz="1800" dirty="0" smtClean="0"/>
+              <a:t>per business standards).</a:t>
+            </a:r>
           </a:p>
         </p:txBody>
       </p:sp>
     </p:spTree>
     <p:extLst>
       <p:ext uri="{BB962C8B-B14F-4D97-AF65-F5344CB8AC3E}">
-        <p14:creationId xmlns:p14="http://schemas.microsoft.com/office/powerpoint/2010/main" val="567511567"/>
+        <p14:creationId xmlns:p14="http://schemas.microsoft.com/office/powerpoint/2010/main" xmlns="" val="567511567"/>
       </p:ext>
     </p:extLst>
   </p:cSld>
@@ -4569,12 +4866,12 @@
       </p:grpSpPr>
       <p:sp>
         <p:nvSpPr>
-          <p:cNvPr id="3" name="Content Placeholder 2"/>
-          <p:cNvSpPr>
-            <a:spLocks noGrp="1"/>
-          </p:cNvSpPr>
-          <p:nvPr>
-            <p:ph idx="1"/>
+          <p:cNvPr id="2" name="Title 1"/>
+          <p:cNvSpPr>
+            <a:spLocks noGrp="1"/>
+          </p:cNvSpPr>
+          <p:nvPr>
+            <p:ph type="title"/>
           </p:nvPr>
         </p:nvSpPr>
         <p:spPr/>
@@ -4584,100 +4881,143 @@
           </a:bodyPr>
           <a:lstStyle/>
           <a:p>
+            <a:pPr algn="ctr"/>
+            <a:r>
+              <a:rPr lang="en-IN" sz="3200" dirty="0" smtClean="0"/>
+              <a:t>List of Significant Variables</a:t>
+            </a:r>
+            <a:endParaRPr lang="en-IN" sz="3200" dirty="0"/>
+          </a:p>
+        </p:txBody>
+      </p:sp>
+      <p:sp>
+        <p:nvSpPr>
+          <p:cNvPr id="3" name="Content Placeholder 2"/>
+          <p:cNvSpPr>
+            <a:spLocks noGrp="1"/>
+          </p:cNvSpPr>
+          <p:nvPr>
+            <p:ph idx="1"/>
+          </p:nvPr>
+        </p:nvSpPr>
+        <p:spPr/>
+        <p:txBody>
+          <a:bodyPr>
+            <a:normAutofit/>
+          </a:bodyPr>
+          <a:lstStyle/>
+          <a:p>
             <a:pPr>
               <a:buFont typeface="Wingdings" panose="05000000000000000000" pitchFamily="2" charset="2"/>
               <a:buChar char="v"/>
             </a:pPr>
             <a:r>
               <a:rPr lang="en-IN" sz="1800" dirty="0" smtClean="0"/>
-              <a:t> After predicting the results, the confusion matrix has been formed in order to view and create a balance between sensitivity and specificity to get the optimal results and optimum accuracy of the model.</a:t>
-            </a:r>
-          </a:p>
-          <a:p>
-            <a:pPr>
+              <a:t>These following variables have been found to be significant in case of predicting attrition –</a:t>
+            </a:r>
+          </a:p>
+          <a:p>
+            <a:pPr lvl="1">
               <a:buFont typeface="Wingdings" panose="05000000000000000000" pitchFamily="2" charset="2"/>
               <a:buChar char="v"/>
             </a:pPr>
             <a:r>
-              <a:rPr lang="en-IN" sz="1800" dirty="0" smtClean="0"/>
-              <a:t>A higher value of sensitivity gives higher true positive value and lower false negative values. Therefore, a fair amount of actual attrition can be predicted. Hence, the threshold for predicted attrition has been taken as 0.158.</a:t>
-            </a:r>
-          </a:p>
-          <a:p>
-            <a:pPr>
+              <a:rPr lang="en-US" sz="1800" dirty="0" smtClean="0"/>
+              <a:t>Age</a:t>
+            </a:r>
+          </a:p>
+          <a:p>
+            <a:pPr lvl="1">
               <a:buFont typeface="Wingdings" panose="05000000000000000000" pitchFamily="2" charset="2"/>
               <a:buChar char="v"/>
             </a:pPr>
             <a:r>
-              <a:rPr lang="en-IN" sz="1800" dirty="0" smtClean="0"/>
-              <a:t>For the balanced model, the accuracy has been found to be 70.5% .</a:t>
-            </a:r>
-          </a:p>
-          <a:p>
-            <a:pPr>
+              <a:rPr lang="en-US" sz="1800" dirty="0" smtClean="0"/>
+              <a:t>Number of Companies Worked</a:t>
+            </a:r>
+          </a:p>
+          <a:p>
+            <a:pPr lvl="1">
               <a:buFont typeface="Wingdings" panose="05000000000000000000" pitchFamily="2" charset="2"/>
               <a:buChar char="v"/>
             </a:pPr>
             <a:r>
-              <a:rPr lang="en-IN" sz="1800" dirty="0"/>
-              <a:t> </a:t>
-            </a:r>
-            <a:r>
-              <a:rPr lang="en-IN" sz="1800" dirty="0" smtClean="0"/>
-              <a:t>KS statistic is a measure of the quality of a model. A KS stat value greater than 40 is indicative of a good stable model which is achieved by the model built.</a:t>
-            </a:r>
-          </a:p>
-          <a:p>
-            <a:pPr>
+              <a:rPr lang="en-US" sz="1800" dirty="0" smtClean="0"/>
+              <a:t>Training Times Last Year</a:t>
+            </a:r>
+          </a:p>
+          <a:p>
+            <a:pPr lvl="1">
               <a:buFont typeface="Wingdings" panose="05000000000000000000" pitchFamily="2" charset="2"/>
               <a:buChar char="v"/>
             </a:pPr>
-            <a:endParaRPr lang="en-IN" sz="1800" dirty="0" smtClean="0"/>
-          </a:p>
-          <a:p>
-            <a:pPr>
+            <a:r>
+              <a:rPr lang="en-US" sz="1800" dirty="0" smtClean="0"/>
+              <a:t>Years Since Last Promotion</a:t>
+            </a:r>
+          </a:p>
+          <a:p>
+            <a:pPr lvl="1">
               <a:buFont typeface="Wingdings" panose="05000000000000000000" pitchFamily="2" charset="2"/>
               <a:buChar char="v"/>
             </a:pPr>
-            <a:endParaRPr lang="en-IN" sz="1800" dirty="0"/>
-          </a:p>
-        </p:txBody>
-      </p:sp>
-      <p:sp>
-        <p:nvSpPr>
-          <p:cNvPr id="6" name="Title 1"/>
-          <p:cNvSpPr>
-            <a:spLocks noGrp="1"/>
-          </p:cNvSpPr>
-          <p:nvPr>
-            <p:ph type="title"/>
-          </p:nvPr>
-        </p:nvSpPr>
-        <p:spPr>
-          <a:xfrm>
-            <a:off x="1136469" y="640080"/>
-            <a:ext cx="9313817" cy="856138"/>
-          </a:xfrm>
-        </p:spPr>
-        <p:txBody>
-          <a:bodyPr>
-            <a:normAutofit/>
-          </a:bodyPr>
-          <a:lstStyle/>
-          <a:p>
-            <a:pPr algn="ctr"/>
-            <a:r>
-              <a:rPr lang="en-IN" sz="3200" dirty="0" smtClean="0"/>
-              <a:t>Model Evaluation</a:t>
-            </a:r>
-            <a:endParaRPr lang="en-IN" sz="2800" dirty="0"/>
+            <a:r>
+              <a:rPr lang="en-US" sz="1800" dirty="0" smtClean="0"/>
+              <a:t>Years with Current Manager</a:t>
+            </a:r>
+          </a:p>
+          <a:p>
+            <a:pPr lvl="1">
+              <a:buFont typeface="Wingdings" panose="05000000000000000000" pitchFamily="2" charset="2"/>
+              <a:buChar char="v"/>
+            </a:pPr>
+            <a:r>
+              <a:rPr lang="en-US" sz="1800" dirty="0" smtClean="0"/>
+              <a:t>Marital Status – Single</a:t>
+            </a:r>
+          </a:p>
+          <a:p>
+            <a:pPr lvl="1">
+              <a:buFont typeface="Wingdings" panose="05000000000000000000" pitchFamily="2" charset="2"/>
+              <a:buChar char="v"/>
+            </a:pPr>
+            <a:r>
+              <a:rPr lang="en-US" sz="1800" dirty="0" smtClean="0"/>
+              <a:t>Environmental Satisfaction – Levels 2, 3 and 4</a:t>
+            </a:r>
+          </a:p>
+          <a:p>
+            <a:pPr lvl="1">
+              <a:buFont typeface="Wingdings" panose="05000000000000000000" pitchFamily="2" charset="2"/>
+              <a:buChar char="v"/>
+            </a:pPr>
+            <a:r>
+              <a:rPr lang="en-US" sz="1800" dirty="0" smtClean="0"/>
+              <a:t>Job Satisfaction – Level 4</a:t>
+            </a:r>
+          </a:p>
+          <a:p>
+            <a:pPr lvl="1">
+              <a:buFont typeface="Wingdings" panose="05000000000000000000" pitchFamily="2" charset="2"/>
+              <a:buChar char="v"/>
+            </a:pPr>
+            <a:r>
+              <a:rPr lang="en-US" sz="1800" dirty="0" smtClean="0"/>
+              <a:t>Average Working Hours – October</a:t>
+            </a:r>
+          </a:p>
+          <a:p>
+            <a:pPr lvl="1">
+              <a:buNone/>
+            </a:pPr>
+            <a:endParaRPr lang="en-IN" sz="1400" dirty="0" smtClean="0"/>
           </a:p>
         </p:txBody>
       </p:sp>
     </p:spTree>
     <p:extLst>
       <p:ext uri="{BB962C8B-B14F-4D97-AF65-F5344CB8AC3E}">
-        <p14:creationId xmlns:p14="http://schemas.microsoft.com/office/powerpoint/2010/main" val="1739856806"/>
+        <p14:creationId xmlns:p14="http://schemas.microsoft.com/office/powerpoint/2010/main" xmlns="" val="567511567"/>
       </p:ext>
     </p:extLst>
   </p:cSld>
@@ -4714,12 +5054,7 @@
             <p:ph idx="1"/>
           </p:nvPr>
         </p:nvSpPr>
-        <p:spPr>
-          <a:xfrm>
-            <a:off x="404949" y="1854926"/>
-            <a:ext cx="5573820" cy="4344261"/>
-          </a:xfrm>
-        </p:spPr>
+        <p:spPr/>
         <p:txBody>
           <a:bodyPr>
             <a:normAutofit/>
@@ -4732,9 +5067,44 @@
             </a:pPr>
             <a:r>
               <a:rPr lang="en-IN" sz="1800" dirty="0" smtClean="0"/>
-              <a:t>Gain chart gives a measure of the effectiveness of the model. </a:t>
-            </a:r>
-            <a:endParaRPr lang="en-IN" sz="1800" dirty="0"/>
+              <a:t>The threshold value should have been chosen to create </a:t>
+            </a:r>
+            <a:r>
+              <a:rPr lang="en-IN" sz="1800" dirty="0" smtClean="0"/>
+              <a:t>a balance between sensitivity and specificity to get the optimal results and optimum accuracy of the model. A </a:t>
+            </a:r>
+            <a:r>
+              <a:rPr lang="en-IN" sz="1800" dirty="0" smtClean="0"/>
+              <a:t>higher value of sensitivity gives higher true positive value and lower false negative values. Therefore, </a:t>
+            </a:r>
+            <a:r>
+              <a:rPr lang="en-IN" sz="1800" dirty="0" smtClean="0"/>
+              <a:t>according to business demands we needed a </a:t>
+            </a:r>
+            <a:r>
+              <a:rPr lang="en-IN" sz="1800" dirty="0" smtClean="0"/>
+              <a:t>fair amount of actual attrition </a:t>
+            </a:r>
+            <a:r>
+              <a:rPr lang="en-IN" sz="1800" dirty="0" smtClean="0"/>
+              <a:t>to</a:t>
+            </a:r>
+            <a:r>
+              <a:rPr lang="en-IN" sz="1800" dirty="0" smtClean="0"/>
+              <a:t> </a:t>
+            </a:r>
+            <a:r>
+              <a:rPr lang="en-IN" sz="1800" dirty="0" smtClean="0"/>
+              <a:t>be predicted. Hence, the </a:t>
+            </a:r>
+            <a:r>
+              <a:rPr lang="en-IN" sz="1800" b="1" dirty="0" smtClean="0"/>
+              <a:t>threshold for predicted attrition has been taken as 0.158</a:t>
+            </a:r>
+            <a:r>
+              <a:rPr lang="en-IN" sz="1800" dirty="0" smtClean="0"/>
+              <a:t>.</a:t>
+            </a:r>
           </a:p>
           <a:p>
             <a:pPr>
@@ -4742,12 +5112,8 @@
               <a:buChar char="v"/>
             </a:pPr>
             <a:r>
-              <a:rPr lang="en-IN" sz="1800" dirty="0" smtClean="0"/>
-              <a:t>With each decile, we can derive th</a:t>
-            </a:r>
-            <a:r>
-              <a:rPr lang="en-IN" sz="1800" dirty="0" smtClean="0"/>
-              <a:t>e percent of employees that can be accurately predicted for a positive attrition.</a:t>
+              <a:rPr lang="en-US" sz="1800" dirty="0" smtClean="0"/>
+              <a:t>The confusion matrix -</a:t>
             </a:r>
           </a:p>
           <a:p>
@@ -4755,32 +5121,129 @@
               <a:buFont typeface="Wingdings" panose="05000000000000000000" pitchFamily="2" charset="2"/>
               <a:buChar char="v"/>
             </a:pPr>
-            <a:r>
-              <a:rPr lang="en-IN" sz="1800" dirty="0" smtClean="0"/>
-              <a:t>From the gain chart, we can deduce that for the </a:t>
-            </a:r>
-            <a:r>
-              <a:rPr lang="en-IN" sz="1800" dirty="0" err="1" smtClean="0"/>
-              <a:t>the</a:t>
-            </a:r>
-            <a:r>
-              <a:rPr lang="en-IN" sz="1800" dirty="0" smtClean="0"/>
-              <a:t> 4</a:t>
-            </a:r>
-            <a:r>
-              <a:rPr lang="en-IN" sz="1800" baseline="30000" dirty="0" smtClean="0"/>
-              <a:t>th</a:t>
-            </a:r>
-            <a:r>
-              <a:rPr lang="en-IN" sz="1800" dirty="0" smtClean="0"/>
-              <a:t> decile, the percentage of accuracy of predicting the number of employees likely to undergo attrition is 73.71.</a:t>
-            </a:r>
-          </a:p>
-          <a:p>
-            <a:pPr marL="0" indent="0">
+            <a:endParaRPr lang="en-US" sz="1800" dirty="0" smtClean="0"/>
+          </a:p>
+          <a:p>
+            <a:pPr>
+              <a:buNone/>
+            </a:pPr>
+            <a:endParaRPr lang="en-US" sz="1800" dirty="0" smtClean="0"/>
+          </a:p>
+          <a:p>
+            <a:pPr>
               <a:buNone/>
             </a:pPr>
             <a:endParaRPr lang="en-IN" sz="1800" dirty="0" smtClean="0"/>
+          </a:p>
+          <a:p>
+            <a:pPr>
+              <a:buFont typeface="Wingdings" panose="05000000000000000000" pitchFamily="2" charset="2"/>
+              <a:buChar char="v"/>
+            </a:pPr>
+            <a:r>
+              <a:rPr lang="en-IN" sz="1800" dirty="0" smtClean="0"/>
+              <a:t>For the balanced model, the </a:t>
+            </a:r>
+            <a:r>
+              <a:rPr lang="en-IN" sz="1800" b="1" dirty="0" smtClean="0"/>
+              <a:t>Accuracy </a:t>
+            </a:r>
+            <a:r>
+              <a:rPr lang="en-IN" sz="1800" b="1" dirty="0" smtClean="0"/>
+              <a:t>has been found to be 70.5%</a:t>
+            </a:r>
+            <a:r>
+              <a:rPr lang="en-IN" sz="1800" dirty="0" smtClean="0"/>
+              <a:t> </a:t>
+            </a:r>
+            <a:r>
+              <a:rPr lang="en-IN" sz="1800" dirty="0" smtClean="0"/>
+              <a:t>,</a:t>
+            </a:r>
+          </a:p>
+          <a:p>
+            <a:pPr>
+              <a:buNone/>
+            </a:pPr>
+            <a:r>
+              <a:rPr lang="en-US" sz="1800" dirty="0" smtClean="0"/>
+              <a:t>				  </a:t>
+            </a:r>
+            <a:r>
+              <a:rPr lang="en-US" sz="1800" b="1" dirty="0" smtClean="0"/>
+              <a:t>Sensitivity has been found to be 71.4%</a:t>
+            </a:r>
+            <a:r>
+              <a:rPr lang="en-US" sz="1800" dirty="0" smtClean="0"/>
+              <a:t>,</a:t>
+            </a:r>
+          </a:p>
+          <a:p>
+            <a:pPr>
+              <a:buNone/>
+            </a:pPr>
+            <a:r>
+              <a:rPr lang="en-US" sz="1800" dirty="0" smtClean="0"/>
+              <a:t> </a:t>
+            </a:r>
+            <a:r>
+              <a:rPr lang="en-US" sz="1800" dirty="0" smtClean="0"/>
+              <a:t>                                                 </a:t>
+            </a:r>
+            <a:r>
+              <a:rPr lang="en-US" sz="1800" b="1" dirty="0" smtClean="0"/>
+              <a:t>Specificity has been found to be 70.4%</a:t>
+            </a:r>
+            <a:r>
+              <a:rPr lang="en-US" sz="1800" dirty="0" smtClean="0"/>
+              <a:t>.</a:t>
+            </a:r>
+            <a:endParaRPr lang="en-IN" sz="1800" dirty="0" smtClean="0"/>
+          </a:p>
+          <a:p>
+            <a:pPr>
+              <a:buFont typeface="Wingdings" panose="05000000000000000000" pitchFamily="2" charset="2"/>
+              <a:buChar char="v"/>
+            </a:pPr>
+            <a:r>
+              <a:rPr lang="en-IN" sz="1800" dirty="0" smtClean="0"/>
+              <a:t> </a:t>
+            </a:r>
+            <a:r>
+              <a:rPr lang="en-IN" sz="1800" dirty="0" smtClean="0"/>
+              <a:t>KS statistic is a measure of the quality of a model. A KS stat value greater than 40 is indicative of a good stable model which is achieved by the model </a:t>
+            </a:r>
+            <a:r>
+              <a:rPr lang="en-IN" sz="1800" dirty="0" smtClean="0"/>
+              <a:t>built</a:t>
+            </a:r>
+            <a:r>
+              <a:rPr lang="en-IN" sz="1800" dirty="0" smtClean="0"/>
+              <a:t>. Our final model has </a:t>
+            </a:r>
+            <a:r>
+              <a:rPr lang="en-IN" sz="1800" b="1" dirty="0" smtClean="0"/>
+              <a:t>KS value 41.7</a:t>
+            </a:r>
+            <a:r>
+              <a:rPr lang="en-IN" sz="1800" dirty="0" smtClean="0"/>
+              <a:t>.</a:t>
+            </a:r>
+            <a:endParaRPr lang="en-IN" sz="1800" dirty="0" smtClean="0"/>
+          </a:p>
+          <a:p>
+            <a:pPr>
+              <a:buFont typeface="Wingdings" panose="05000000000000000000" pitchFamily="2" charset="2"/>
+              <a:buChar char="v"/>
+            </a:pPr>
+            <a:endParaRPr lang="en-IN" sz="1800" dirty="0" smtClean="0"/>
+          </a:p>
+          <a:p>
+            <a:pPr>
+              <a:buFont typeface="Wingdings" panose="05000000000000000000" pitchFamily="2" charset="2"/>
+              <a:buChar char="v"/>
+            </a:pPr>
+            <a:endParaRPr lang="en-IN" sz="1800" dirty="0"/>
           </a:p>
         </p:txBody>
       </p:sp>
@@ -4809,46 +5272,211 @@
             <a:pPr algn="ctr"/>
             <a:r>
               <a:rPr lang="en-IN" sz="3200" dirty="0" smtClean="0"/>
-              <a:t>Gain Chart</a:t>
+              <a:t>Model Evaluation</a:t>
             </a:r>
             <a:endParaRPr lang="en-IN" sz="2800" dirty="0"/>
           </a:p>
         </p:txBody>
       </p:sp>
-      <p:pic>
-        <p:nvPicPr>
-          <p:cNvPr id="2" name="Picture 1"/>
-          <p:cNvPicPr>
-            <a:picLocks noChangeAspect="1"/>
-          </p:cNvPicPr>
+      <p:graphicFrame>
+        <p:nvGraphicFramePr>
+          <p:cNvPr id="4" name="Table 3"/>
+          <p:cNvGraphicFramePr>
+            <a:graphicFrameLocks noGrp="1"/>
+          </p:cNvGraphicFramePr>
           <p:nvPr/>
-        </p:nvPicPr>
-        <p:blipFill>
-          <a:blip r:embed="rId2">
-            <a:extLst>
-              <a:ext uri="{28A0092B-C50C-407E-A947-70E740481C1C}">
-                <a14:useLocalDpi xmlns:a14="http://schemas.microsoft.com/office/drawing/2010/main" val="0"/>
-              </a:ext>
-            </a:extLst>
-          </a:blip>
-          <a:stretch>
-            <a:fillRect/>
-          </a:stretch>
-        </p:blipFill>
-        <p:spPr>
-          <a:xfrm>
-            <a:off x="6561991" y="1951173"/>
-            <a:ext cx="4621823" cy="3956891"/>
-          </a:xfrm>
-          <a:prstGeom prst="rect">
-            <a:avLst/>
-          </a:prstGeom>
-        </p:spPr>
-      </p:pic>
+        </p:nvGraphicFramePr>
+        <p:xfrm>
+          <a:off x="2934675" y="2935328"/>
+          <a:ext cx="3829539" cy="1463040"/>
+        </p:xfrm>
+        <a:graphic>
+          <a:graphicData uri="http://schemas.openxmlformats.org/drawingml/2006/table">
+            <a:tbl>
+              <a:tblPr firstRow="1" bandRow="1">
+                <a:tableStyleId>{5940675A-B579-460E-94D1-54222C63F5DA}</a:tableStyleId>
+              </a:tblPr>
+              <a:tblGrid>
+                <a:gridCol w="1276513"/>
+                <a:gridCol w="1276513"/>
+                <a:gridCol w="1276513"/>
+              </a:tblGrid>
+              <a:tr h="195222">
+                <a:tc>
+                  <a:txBody>
+                    <a:bodyPr/>
+                    <a:lstStyle/>
+                    <a:p>
+                      <a:endParaRPr lang="en-IN" dirty="0"/>
+                    </a:p>
+                  </a:txBody>
+                  <a:tcPr/>
+                </a:tc>
+                <a:tc gridSpan="2">
+                  <a:txBody>
+                    <a:bodyPr/>
+                    <a:lstStyle/>
+                    <a:p>
+                      <a:r>
+                        <a:rPr lang="en-US" b="1" dirty="0" smtClean="0"/>
+                        <a:t>Reference</a:t>
+                      </a:r>
+                      <a:endParaRPr lang="en-IN" b="1" dirty="0"/>
+                    </a:p>
+                  </a:txBody>
+                  <a:tcPr/>
+                </a:tc>
+                <a:tc hMerge="1">
+                  <a:txBody>
+                    <a:bodyPr/>
+                    <a:lstStyle/>
+                    <a:p>
+                      <a:endParaRPr lang="en-IN" dirty="0"/>
+                    </a:p>
+                  </a:txBody>
+                  <a:tcPr/>
+                </a:tc>
+              </a:tr>
+              <a:tr h="195222">
+                <a:tc>
+                  <a:txBody>
+                    <a:bodyPr/>
+                    <a:lstStyle/>
+                    <a:p>
+                      <a:r>
+                        <a:rPr lang="en-US" b="1" dirty="0" smtClean="0"/>
+                        <a:t>Prediction</a:t>
+                      </a:r>
+                      <a:endParaRPr lang="en-IN" b="1" dirty="0"/>
+                    </a:p>
+                  </a:txBody>
+                  <a:tcPr/>
+                </a:tc>
+                <a:tc>
+                  <a:txBody>
+                    <a:bodyPr/>
+                    <a:lstStyle/>
+                    <a:p>
+                      <a:r>
+                        <a:rPr lang="en-US" b="1" dirty="0" smtClean="0"/>
+                        <a:t>No</a:t>
+                      </a:r>
+                      <a:endParaRPr lang="en-IN" b="1" dirty="0"/>
+                    </a:p>
+                  </a:txBody>
+                  <a:tcPr/>
+                </a:tc>
+                <a:tc>
+                  <a:txBody>
+                    <a:bodyPr/>
+                    <a:lstStyle/>
+                    <a:p>
+                      <a:r>
+                        <a:rPr lang="en-US" b="1" dirty="0" smtClean="0"/>
+                        <a:t>Yes</a:t>
+                      </a:r>
+                      <a:endParaRPr lang="en-IN" b="1" dirty="0"/>
+                    </a:p>
+                  </a:txBody>
+                  <a:tcPr/>
+                </a:tc>
+              </a:tr>
+              <a:tr h="195222">
+                <a:tc>
+                  <a:txBody>
+                    <a:bodyPr/>
+                    <a:lstStyle/>
+                    <a:p>
+                      <a:r>
+                        <a:rPr lang="en-US" b="1" dirty="0" smtClean="0"/>
+                        <a:t>No</a:t>
+                      </a:r>
+                      <a:endParaRPr lang="en-IN" b="1" dirty="0"/>
+                    </a:p>
+                  </a:txBody>
+                  <a:tcPr/>
+                </a:tc>
+                <a:tc>
+                  <a:txBody>
+                    <a:bodyPr/>
+                    <a:lstStyle/>
+                    <a:p>
+                      <a:r>
+                        <a:rPr lang="en-US" dirty="0" smtClean="0"/>
+                        <a:t>781</a:t>
+                      </a:r>
+                      <a:endParaRPr lang="en-IN" dirty="0"/>
+                    </a:p>
+                  </a:txBody>
+                  <a:tcPr/>
+                </a:tc>
+                <a:tc>
+                  <a:txBody>
+                    <a:bodyPr/>
+                    <a:lstStyle/>
+                    <a:p>
+                      <a:r>
+                        <a:rPr lang="en-US" dirty="0" smtClean="0"/>
+                        <a:t>61</a:t>
+                      </a:r>
+                      <a:endParaRPr lang="en-IN" dirty="0"/>
+                    </a:p>
+                  </a:txBody>
+                  <a:tcPr/>
+                </a:tc>
+              </a:tr>
+              <a:tr h="195222">
+                <a:tc>
+                  <a:txBody>
+                    <a:bodyPr/>
+                    <a:lstStyle/>
+                    <a:p>
+                      <a:r>
+                        <a:rPr lang="en-US" b="1" dirty="0" smtClean="0"/>
+                        <a:t>Yes</a:t>
+                      </a:r>
+                      <a:endParaRPr lang="en-IN" b="1" dirty="0"/>
+                    </a:p>
+                  </a:txBody>
+                  <a:tcPr/>
+                </a:tc>
+                <a:tc>
+                  <a:txBody>
+                    <a:bodyPr/>
+                    <a:lstStyle/>
+                    <a:p>
+                      <a:r>
+                        <a:rPr lang="en-US" dirty="0" smtClean="0"/>
+                        <a:t>329</a:t>
+                      </a:r>
+                      <a:endParaRPr lang="en-IN" dirty="0"/>
+                    </a:p>
+                  </a:txBody>
+                  <a:tcPr/>
+                </a:tc>
+                <a:tc>
+                  <a:txBody>
+                    <a:bodyPr/>
+                    <a:lstStyle/>
+                    <a:p>
+                      <a:r>
+                        <a:rPr lang="en-US" dirty="0" smtClean="0"/>
+                        <a:t>152</a:t>
+                      </a:r>
+                      <a:endParaRPr lang="en-IN" dirty="0"/>
+                    </a:p>
+                  </a:txBody>
+                  <a:tcPr/>
+                </a:tc>
+              </a:tr>
+            </a:tbl>
+          </a:graphicData>
+        </a:graphic>
+      </p:graphicFrame>
     </p:spTree>
     <p:extLst>
       <p:ext uri="{BB962C8B-B14F-4D97-AF65-F5344CB8AC3E}">
-        <p14:creationId xmlns:p14="http://schemas.microsoft.com/office/powerpoint/2010/main" val="3733554285"/>
+        <p14:creationId xmlns:p14="http://schemas.microsoft.com/office/powerpoint/2010/main" xmlns="" val="1739856806"/>
       </p:ext>
     </p:extLst>
   </p:cSld>
@@ -4903,8 +5531,9 @@
             </a:pPr>
             <a:r>
               <a:rPr lang="en-IN" sz="1800" dirty="0" smtClean="0"/>
-              <a:t>Lift chart, tells us the ratio of gain chart for the R predicted model to the random model.</a:t>
-            </a:r>
+              <a:t>Gain chart gives a measure of the effectiveness of the model. </a:t>
+            </a:r>
+            <a:endParaRPr lang="en-IN" sz="1800" dirty="0"/>
           </a:p>
           <a:p>
             <a:pPr>
@@ -4913,7 +5542,7 @@
             </a:pPr>
             <a:r>
               <a:rPr lang="en-IN" sz="1800" dirty="0" smtClean="0"/>
-              <a:t>It tells us how well R predicted model would predict as compared to a random generated model for a given decile.</a:t>
+              <a:t>With each decile, we can derive the percent of employees that can be accurately predicted for a positive attrition.</a:t>
             </a:r>
           </a:p>
           <a:p>
@@ -4923,7 +5552,15 @@
             </a:pPr>
             <a:r>
               <a:rPr lang="en-IN" sz="1800" dirty="0" smtClean="0"/>
-              <a:t>For the 4</a:t>
+              <a:t>From the gain chart, we can deduce that for the </a:t>
+            </a:r>
+            <a:r>
+              <a:rPr lang="en-IN" sz="1800" dirty="0" err="1" smtClean="0"/>
+              <a:t>the</a:t>
+            </a:r>
+            <a:r>
+              <a:rPr lang="en-IN" sz="1800" dirty="0" smtClean="0"/>
+              <a:t> 4</a:t>
             </a:r>
             <a:r>
               <a:rPr lang="en-IN" sz="1800" baseline="30000" dirty="0" smtClean="0"/>
@@ -4931,13 +5568,43 @@
             </a:r>
             <a:r>
               <a:rPr lang="en-IN" sz="1800" dirty="0" smtClean="0"/>
-              <a:t> decile, the gain of the R generated model </a:t>
-            </a:r>
-            <a:r>
-              <a:rPr lang="en-IN" sz="1800" dirty="0" smtClean="0"/>
-              <a:t>predicts 1.84 times better. </a:t>
-            </a:r>
-            <a:endParaRPr lang="en-IN" sz="1800" dirty="0"/>
+              <a:t> decile, the percentage of accuracy of predicting the number of employees likely to undergo attrition is </a:t>
+            </a:r>
+            <a:r>
+              <a:rPr lang="en-IN" sz="1800" dirty="0" smtClean="0"/>
+              <a:t>73.71, till 5</a:t>
+            </a:r>
+            <a:r>
+              <a:rPr lang="en-IN" sz="1800" baseline="30000" dirty="0" smtClean="0"/>
+              <a:t>th</a:t>
+            </a:r>
+            <a:r>
+              <a:rPr lang="en-IN" sz="1800" dirty="0" smtClean="0"/>
+              <a:t> </a:t>
+            </a:r>
+            <a:r>
+              <a:rPr lang="en-IN" sz="1800" dirty="0" err="1" smtClean="0"/>
+              <a:t>decile</a:t>
+            </a:r>
+            <a:r>
+              <a:rPr lang="en-IN" sz="1800" dirty="0" smtClean="0"/>
+              <a:t> we get 81.69% attritions covered and till 6</a:t>
+            </a:r>
+            <a:r>
+              <a:rPr lang="en-IN" sz="1800" baseline="30000" dirty="0" smtClean="0"/>
+              <a:t>th</a:t>
+            </a:r>
+            <a:r>
+              <a:rPr lang="en-IN" sz="1800" dirty="0" smtClean="0"/>
+              <a:t> we can cover nearly 88% of attritions correctly. </a:t>
+            </a:r>
+            <a:endParaRPr lang="en-IN" sz="1800" dirty="0" smtClean="0"/>
+          </a:p>
+          <a:p>
+            <a:pPr marL="0" indent="0">
+              <a:buNone/>
+            </a:pPr>
+            <a:endParaRPr lang="en-IN" sz="1800" dirty="0" smtClean="0"/>
           </a:p>
         </p:txBody>
       </p:sp>
@@ -4966,9 +5633,9 @@
             <a:pPr algn="ctr"/>
             <a:r>
               <a:rPr lang="en-IN" sz="3200" dirty="0" smtClean="0"/>
-              <a:t>Lift Chart</a:t>
-            </a:r>
-            <a:endParaRPr lang="en-IN" sz="2000" dirty="0"/>
+              <a:t>Gain Chart</a:t>
+            </a:r>
+            <a:endParaRPr lang="en-IN" sz="2800" dirty="0"/>
           </a:p>
         </p:txBody>
       </p:sp>
@@ -4984,7 +5651,7 @@
           <a:blip r:embed="rId2">
             <a:extLst>
               <a:ext uri="{28A0092B-C50C-407E-A947-70E740481C1C}">
-                <a14:useLocalDpi xmlns:a14="http://schemas.microsoft.com/office/drawing/2010/main" val="0"/>
+                <a14:useLocalDpi xmlns:a14="http://schemas.microsoft.com/office/drawing/2010/main" xmlns="" val="0"/>
               </a:ext>
             </a:extLst>
           </a:blip>
@@ -4994,8 +5661,8 @@
         </p:blipFill>
         <p:spPr>
           <a:xfrm>
-            <a:off x="6562800" y="1951199"/>
-            <a:ext cx="4621250" cy="3956400"/>
+            <a:off x="6561991" y="1951173"/>
+            <a:ext cx="4621823" cy="3956891"/>
           </a:xfrm>
           <a:prstGeom prst="rect">
             <a:avLst/>
@@ -5005,7 +5672,7 @@
     </p:spTree>
     <p:extLst>
       <p:ext uri="{BB962C8B-B14F-4D97-AF65-F5344CB8AC3E}">
-        <p14:creationId xmlns:p14="http://schemas.microsoft.com/office/powerpoint/2010/main" val="1057818561"/>
+        <p14:creationId xmlns:p14="http://schemas.microsoft.com/office/powerpoint/2010/main" xmlns="" val="3733554285"/>
       </p:ext>
     </p:extLst>
   </p:cSld>
@@ -5058,7 +5725,7 @@
     </a:clrScheme>
     <a:fontScheme name="Office Theme">
       <a:majorFont>
-        <a:latin typeface="Calibri Light" panose="020F0302020204030204"/>
+        <a:latin typeface="Calibri Light"/>
         <a:ea typeface=""/>
         <a:cs typeface=""/>
         <a:font script="Jpan" typeface="游ゴシック Light"/>
@@ -5093,7 +5760,7 @@
         <a:font script="Geor" typeface="Sylfaen"/>
       </a:majorFont>
       <a:minorFont>
-        <a:latin typeface="Calibri" panose="020F0502020204030204"/>
+        <a:latin typeface="Calibri"/>
         <a:ea typeface=""/>
         <a:cs typeface=""/>
         <a:font script="Jpan" typeface="游ゴシック"/>
@@ -5270,7 +5937,7 @@
   <a:extraClrSchemeLst/>
   <a:extLst>
     <a:ext uri="{05A4C25C-085E-4340-85A3-A5531E510DB2}">
-      <thm15:themeFamily xmlns:thm15="http://schemas.microsoft.com/office/thememl/2012/main" xmlns="" name="Office Theme" id="{62F939B6-93AF-4DB8-9C6B-D6C7DFDC589F}" vid="{4A3C46E8-61CC-4603-A589-7422A47A8E4A}"/>
+      <thm15:themeFamily xmlns="" xmlns:thm15="http://schemas.microsoft.com/office/thememl/2012/main" name="Office Theme" id="{62F939B6-93AF-4DB8-9C6B-D6C7DFDC589F}" vid="{4A3C46E8-61CC-4603-A589-7422A47A8E4A}"/>
     </a:ext>
   </a:extLst>
 </a:theme>
@@ -5319,7 +5986,7 @@
     </a:clrScheme>
     <a:fontScheme name="Office">
       <a:majorFont>
-        <a:latin typeface="Calibri Light" panose="020F0302020204030204"/>
+        <a:latin typeface="Calibri Light"/>
         <a:ea typeface=""/>
         <a:cs typeface=""/>
         <a:font script="Jpan" typeface="游ゴシック Light"/>
@@ -5371,7 +6038,7 @@
         <a:font script="Tfng" typeface="Ebrima"/>
       </a:majorFont>
       <a:minorFont>
-        <a:latin typeface="Calibri" panose="020F0502020204030204"/>
+        <a:latin typeface="Calibri"/>
         <a:ea typeface=""/>
         <a:cs typeface=""/>
         <a:font script="Jpan" typeface="游ゴシック"/>
@@ -5565,7 +6232,7 @@
   <a:extraClrSchemeLst/>
   <a:extLst>
     <a:ext uri="{05A4C25C-085E-4340-85A3-A5531E510DB2}">
-      <thm15:themeFamily xmlns:thm15="http://schemas.microsoft.com/office/thememl/2012/main" xmlns="" name="Office Theme" id="{62F939B6-93AF-4DB8-9C6B-D6C7DFDC589F}" vid="{4A3C46E8-61CC-4603-A589-7422A47A8E4A}"/>
+      <thm15:themeFamily xmlns="" xmlns:thm15="http://schemas.microsoft.com/office/thememl/2012/main" name="Office Theme" id="{62F939B6-93AF-4DB8-9C6B-D6C7DFDC589F}" vid="{4A3C46E8-61CC-4603-A589-7422A47A8E4A}"/>
     </a:ext>
   </a:extLst>
 </a:theme>

</xml_diff>